<commit_message>
Improved figure of generalisation performance
</commit_message>
<xml_diff>
--- a/chapter_06/figures/optuna_evaluation_metrics.pptx
+++ b/chapter_06/figures/optuna_evaluation_metrics.pptx
@@ -115,7 +115,7 @@
 <file path=ppt/revisionInfo.xml><?xml version="1.0" encoding="utf-8"?>
 <p1510:revInfo xmlns:a="http://schemas.openxmlformats.org/drawingml/2006/main" xmlns:r="http://schemas.openxmlformats.org/officeDocument/2006/relationships" xmlns:p1510="http://schemas.microsoft.com/office/powerpoint/2015/10/main">
   <p1510:revLst>
-    <p1510:client id="{19698738-8B30-4641-92DF-503FDCF97601}" v="98" dt="2025-07-04T15:42:14.606"/>
+    <p1510:client id="{19698738-8B30-4641-92DF-503FDCF97601}" v="99" dt="2025-07-07T13:59:06.549"/>
   </p1510:revLst>
 </p1510:revInfo>
 </file>
@@ -125,16 +125,24 @@
   <pc:docChgLst>
     <pc:chgData name="Fatima Pillosu" userId="a6295d4dc9e22643" providerId="LiveId" clId="{19698738-8B30-4641-92DF-503FDCF97601}"/>
     <pc:docChg chg="undo custSel addSld delSld modSld modMainMaster">
-      <pc:chgData name="Fatima Pillosu" userId="a6295d4dc9e22643" providerId="LiveId" clId="{19698738-8B30-4641-92DF-503FDCF97601}" dt="2025-07-04T15:47:57.994" v="2369" actId="208"/>
+      <pc:chgData name="Fatima Pillosu" userId="a6295d4dc9e22643" providerId="LiveId" clId="{19698738-8B30-4641-92DF-503FDCF97601}" dt="2025-07-07T14:01:15.383" v="2487" actId="1035"/>
       <pc:docMkLst>
         <pc:docMk/>
       </pc:docMkLst>
       <pc:sldChg chg="addSp delSp modSp mod">
-        <pc:chgData name="Fatima Pillosu" userId="a6295d4dc9e22643" providerId="LiveId" clId="{19698738-8B30-4641-92DF-503FDCF97601}" dt="2025-07-04T15:47:57.994" v="2369" actId="208"/>
+        <pc:chgData name="Fatima Pillosu" userId="a6295d4dc9e22643" providerId="LiveId" clId="{19698738-8B30-4641-92DF-503FDCF97601}" dt="2025-07-07T14:01:15.383" v="2487" actId="1035"/>
         <pc:sldMkLst>
           <pc:docMk/>
           <pc:sldMk cId="1077421182" sldId="256"/>
         </pc:sldMkLst>
+        <pc:spChg chg="mod">
+          <ac:chgData name="Fatima Pillosu" userId="a6295d4dc9e22643" providerId="LiveId" clId="{19698738-8B30-4641-92DF-503FDCF97601}" dt="2025-07-07T13:59:06.548" v="2370"/>
+          <ac:spMkLst>
+            <pc:docMk/>
+            <pc:sldMk cId="1077421182" sldId="256"/>
+            <ac:spMk id="3" creationId="{AD3D64D7-A2FC-1830-076B-361358412A47}"/>
+          </ac:spMkLst>
+        </pc:spChg>
         <pc:spChg chg="add del mod">
           <ac:chgData name="Fatima Pillosu" userId="a6295d4dc9e22643" providerId="LiveId" clId="{19698738-8B30-4641-92DF-503FDCF97601}" dt="2025-07-04T14:39:59.766" v="1181" actId="21"/>
           <ac:spMkLst>
@@ -151,6 +159,14 @@
             <ac:spMk id="4" creationId="{64099BC4-A7EF-520D-694B-2E0B2AF825FD}"/>
           </ac:spMkLst>
         </pc:spChg>
+        <pc:spChg chg="mod">
+          <ac:chgData name="Fatima Pillosu" userId="a6295d4dc9e22643" providerId="LiveId" clId="{19698738-8B30-4641-92DF-503FDCF97601}" dt="2025-07-07T13:59:06.548" v="2370"/>
+          <ac:spMkLst>
+            <pc:docMk/>
+            <pc:sldMk cId="1077421182" sldId="256"/>
+            <ac:spMk id="4" creationId="{7895D96C-416F-0634-EDE0-2DC459727B5C}"/>
+          </ac:spMkLst>
+        </pc:spChg>
         <pc:spChg chg="add del mod">
           <ac:chgData name="Fatima Pillosu" userId="a6295d4dc9e22643" providerId="LiveId" clId="{19698738-8B30-4641-92DF-503FDCF97601}" dt="2025-07-04T14:39:59.766" v="1181" actId="21"/>
           <ac:spMkLst>
@@ -159,6 +175,14 @@
             <ac:spMk id="5" creationId="{7C4328C5-33E1-765B-7972-24E76C5F71C2}"/>
           </ac:spMkLst>
         </pc:spChg>
+        <pc:spChg chg="mod">
+          <ac:chgData name="Fatima Pillosu" userId="a6295d4dc9e22643" providerId="LiveId" clId="{19698738-8B30-4641-92DF-503FDCF97601}" dt="2025-07-07T13:59:06.548" v="2370"/>
+          <ac:spMkLst>
+            <pc:docMk/>
+            <pc:sldMk cId="1077421182" sldId="256"/>
+            <ac:spMk id="6" creationId="{A82F9947-706C-C8E9-E039-0F8C98F44272}"/>
+          </ac:spMkLst>
+        </pc:spChg>
         <pc:spChg chg="add del mod">
           <ac:chgData name="Fatima Pillosu" userId="a6295d4dc9e22643" providerId="LiveId" clId="{19698738-8B30-4641-92DF-503FDCF97601}" dt="2025-07-04T14:39:59.766" v="1181" actId="21"/>
           <ac:spMkLst>
@@ -175,6 +199,14 @@
             <ac:spMk id="7" creationId="{35EE0C62-D55E-AC1E-E754-D55CDD44C2D6}"/>
           </ac:spMkLst>
         </pc:spChg>
+        <pc:spChg chg="mod">
+          <ac:chgData name="Fatima Pillosu" userId="a6295d4dc9e22643" providerId="LiveId" clId="{19698738-8B30-4641-92DF-503FDCF97601}" dt="2025-07-07T13:59:06.548" v="2370"/>
+          <ac:spMkLst>
+            <pc:docMk/>
+            <pc:sldMk cId="1077421182" sldId="256"/>
+            <ac:spMk id="7" creationId="{7C57723D-332E-1D30-41C6-AC1A6C726819}"/>
+          </ac:spMkLst>
+        </pc:spChg>
         <pc:spChg chg="add del mod">
           <ac:chgData name="Fatima Pillosu" userId="a6295d4dc9e22643" providerId="LiveId" clId="{19698738-8B30-4641-92DF-503FDCF97601}" dt="2025-07-04T14:39:59.766" v="1181" actId="21"/>
           <ac:spMkLst>
@@ -183,6 +215,14 @@
             <ac:spMk id="8" creationId="{5D8CECBF-4F86-2AD2-D94E-C583967CB7D3}"/>
           </ac:spMkLst>
         </pc:spChg>
+        <pc:spChg chg="mod">
+          <ac:chgData name="Fatima Pillosu" userId="a6295d4dc9e22643" providerId="LiveId" clId="{19698738-8B30-4641-92DF-503FDCF97601}" dt="2025-07-07T13:59:06.548" v="2370"/>
+          <ac:spMkLst>
+            <pc:docMk/>
+            <pc:sldMk cId="1077421182" sldId="256"/>
+            <ac:spMk id="9" creationId="{5EDC42DB-1C47-3585-A8BB-0D6F1A778234}"/>
+          </ac:spMkLst>
+        </pc:spChg>
         <pc:spChg chg="add del mod">
           <ac:chgData name="Fatima Pillosu" userId="a6295d4dc9e22643" providerId="LiveId" clId="{19698738-8B30-4641-92DF-503FDCF97601}" dt="2025-07-04T14:39:59.766" v="1181" actId="21"/>
           <ac:spMkLst>
@@ -191,6 +231,14 @@
             <ac:spMk id="9" creationId="{E7D6C2A3-B522-548E-3EC8-BF53B9442872}"/>
           </ac:spMkLst>
         </pc:spChg>
+        <pc:spChg chg="mod">
+          <ac:chgData name="Fatima Pillosu" userId="a6295d4dc9e22643" providerId="LiveId" clId="{19698738-8B30-4641-92DF-503FDCF97601}" dt="2025-07-07T13:59:06.548" v="2370"/>
+          <ac:spMkLst>
+            <pc:docMk/>
+            <pc:sldMk cId="1077421182" sldId="256"/>
+            <ac:spMk id="10" creationId="{0B7209E3-94EF-0867-055D-5CA5BDB0F8CC}"/>
+          </ac:spMkLst>
+        </pc:spChg>
         <pc:spChg chg="add del mod">
           <ac:chgData name="Fatima Pillosu" userId="a6295d4dc9e22643" providerId="LiveId" clId="{19698738-8B30-4641-92DF-503FDCF97601}" dt="2025-07-04T14:39:59.766" v="1181" actId="21"/>
           <ac:spMkLst>
@@ -207,6 +255,14 @@
             <ac:spMk id="11" creationId="{E6165A3B-C495-5758-04F0-D44D9FCA46B1}"/>
           </ac:spMkLst>
         </pc:spChg>
+        <pc:spChg chg="mod">
+          <ac:chgData name="Fatima Pillosu" userId="a6295d4dc9e22643" providerId="LiveId" clId="{19698738-8B30-4641-92DF-503FDCF97601}" dt="2025-07-07T13:59:06.548" v="2370"/>
+          <ac:spMkLst>
+            <pc:docMk/>
+            <pc:sldMk cId="1077421182" sldId="256"/>
+            <ac:spMk id="12" creationId="{B919007B-DAAB-9133-CA8F-F8AEDE9EF94C}"/>
+          </ac:spMkLst>
+        </pc:spChg>
         <pc:spChg chg="add del mod">
           <ac:chgData name="Fatima Pillosu" userId="a6295d4dc9e22643" providerId="LiveId" clId="{19698738-8B30-4641-92DF-503FDCF97601}" dt="2025-07-04T14:39:59.766" v="1181" actId="21"/>
           <ac:spMkLst>
@@ -223,6 +279,14 @@
             <ac:spMk id="13" creationId="{0AD9D9CC-EC22-8091-0FC1-C84B991E16F9}"/>
           </ac:spMkLst>
         </pc:spChg>
+        <pc:spChg chg="mod">
+          <ac:chgData name="Fatima Pillosu" userId="a6295d4dc9e22643" providerId="LiveId" clId="{19698738-8B30-4641-92DF-503FDCF97601}" dt="2025-07-07T13:59:06.548" v="2370"/>
+          <ac:spMkLst>
+            <pc:docMk/>
+            <pc:sldMk cId="1077421182" sldId="256"/>
+            <ac:spMk id="13" creationId="{3B7D9A1C-B46C-E4D8-825F-F38504C3FDEE}"/>
+          </ac:spMkLst>
+        </pc:spChg>
         <pc:spChg chg="add del mod">
           <ac:chgData name="Fatima Pillosu" userId="a6295d4dc9e22643" providerId="LiveId" clId="{19698738-8B30-4641-92DF-503FDCF97601}" dt="2025-07-04T14:39:59.766" v="1181" actId="21"/>
           <ac:spMkLst>
@@ -239,6 +303,22 @@
             <ac:spMk id="15" creationId="{7CA80247-944D-A79D-DD75-278A2FC157C4}"/>
           </ac:spMkLst>
         </pc:spChg>
+        <pc:spChg chg="mod">
+          <ac:chgData name="Fatima Pillosu" userId="a6295d4dc9e22643" providerId="LiveId" clId="{19698738-8B30-4641-92DF-503FDCF97601}" dt="2025-07-07T13:59:06.548" v="2370"/>
+          <ac:spMkLst>
+            <pc:docMk/>
+            <pc:sldMk cId="1077421182" sldId="256"/>
+            <ac:spMk id="15" creationId="{898CBFFC-51D6-E3A6-B65C-76E9E62A659D}"/>
+          </ac:spMkLst>
+        </pc:spChg>
+        <pc:spChg chg="mod">
+          <ac:chgData name="Fatima Pillosu" userId="a6295d4dc9e22643" providerId="LiveId" clId="{19698738-8B30-4641-92DF-503FDCF97601}" dt="2025-07-07T13:59:06.548" v="2370"/>
+          <ac:spMkLst>
+            <pc:docMk/>
+            <pc:sldMk cId="1077421182" sldId="256"/>
+            <ac:spMk id="16" creationId="{4F4FE2DD-2023-94F4-702E-49C62078BF1D}"/>
+          </ac:spMkLst>
+        </pc:spChg>
         <pc:spChg chg="add del mod">
           <ac:chgData name="Fatima Pillosu" userId="a6295d4dc9e22643" providerId="LiveId" clId="{19698738-8B30-4641-92DF-503FDCF97601}" dt="2025-07-04T14:41:42.468" v="1273" actId="21"/>
           <ac:spMkLst>
@@ -255,6 +335,14 @@
             <ac:spMk id="17" creationId="{64099BC4-A7EF-520D-694B-2E0B2AF825FD}"/>
           </ac:spMkLst>
         </pc:spChg>
+        <pc:spChg chg="mod">
+          <ac:chgData name="Fatima Pillosu" userId="a6295d4dc9e22643" providerId="LiveId" clId="{19698738-8B30-4641-92DF-503FDCF97601}" dt="2025-07-07T13:59:06.548" v="2370"/>
+          <ac:spMkLst>
+            <pc:docMk/>
+            <pc:sldMk cId="1077421182" sldId="256"/>
+            <ac:spMk id="18" creationId="{58451BEB-1A5D-0A68-3713-AA01552F4649}"/>
+          </ac:spMkLst>
+        </pc:spChg>
         <pc:spChg chg="add del mod">
           <ac:chgData name="Fatima Pillosu" userId="a6295d4dc9e22643" providerId="LiveId" clId="{19698738-8B30-4641-92DF-503FDCF97601}" dt="2025-07-04T14:41:42.468" v="1273" actId="21"/>
           <ac:spMkLst>
@@ -271,6 +359,14 @@
             <ac:spMk id="19" creationId="{CCC1F08C-0AFA-416C-B55A-7A0F26E1CD71}"/>
           </ac:spMkLst>
         </pc:spChg>
+        <pc:spChg chg="mod">
+          <ac:chgData name="Fatima Pillosu" userId="a6295d4dc9e22643" providerId="LiveId" clId="{19698738-8B30-4641-92DF-503FDCF97601}" dt="2025-07-07T13:59:06.548" v="2370"/>
+          <ac:spMkLst>
+            <pc:docMk/>
+            <pc:sldMk cId="1077421182" sldId="256"/>
+            <ac:spMk id="19" creationId="{E18B4FE3-2D0A-CB1A-C022-02785FFF8966}"/>
+          </ac:spMkLst>
+        </pc:spChg>
         <pc:spChg chg="add del mod">
           <ac:chgData name="Fatima Pillosu" userId="a6295d4dc9e22643" providerId="LiveId" clId="{19698738-8B30-4641-92DF-503FDCF97601}" dt="2025-07-04T14:41:42.468" v="1273" actId="21"/>
           <ac:spMkLst>
@@ -287,6 +383,22 @@
             <ac:spMk id="21" creationId="{5D8CECBF-4F86-2AD2-D94E-C583967CB7D3}"/>
           </ac:spMkLst>
         </pc:spChg>
+        <pc:spChg chg="mod">
+          <ac:chgData name="Fatima Pillosu" userId="a6295d4dc9e22643" providerId="LiveId" clId="{19698738-8B30-4641-92DF-503FDCF97601}" dt="2025-07-07T13:59:06.548" v="2370"/>
+          <ac:spMkLst>
+            <pc:docMk/>
+            <pc:sldMk cId="1077421182" sldId="256"/>
+            <ac:spMk id="21" creationId="{E3E5C760-592D-E744-5BC3-F4EB4F1E1850}"/>
+          </ac:spMkLst>
+        </pc:spChg>
+        <pc:spChg chg="mod">
+          <ac:chgData name="Fatima Pillosu" userId="a6295d4dc9e22643" providerId="LiveId" clId="{19698738-8B30-4641-92DF-503FDCF97601}" dt="2025-07-07T13:59:06.548" v="2370"/>
+          <ac:spMkLst>
+            <pc:docMk/>
+            <pc:sldMk cId="1077421182" sldId="256"/>
+            <ac:spMk id="22" creationId="{CDB8B6A4-7952-D738-1515-16FE976B7938}"/>
+          </ac:spMkLst>
+        </pc:spChg>
         <pc:spChg chg="add del mod">
           <ac:chgData name="Fatima Pillosu" userId="a6295d4dc9e22643" providerId="LiveId" clId="{19698738-8B30-4641-92DF-503FDCF97601}" dt="2025-07-04T14:41:42.468" v="1273" actId="21"/>
           <ac:spMkLst>
@@ -303,6 +415,14 @@
             <ac:spMk id="23" creationId="{C43E9711-62D3-2783-DB19-B6244B5C7079}"/>
           </ac:spMkLst>
         </pc:spChg>
+        <pc:spChg chg="mod">
+          <ac:chgData name="Fatima Pillosu" userId="a6295d4dc9e22643" providerId="LiveId" clId="{19698738-8B30-4641-92DF-503FDCF97601}" dt="2025-07-07T13:59:06.548" v="2370"/>
+          <ac:spMkLst>
+            <pc:docMk/>
+            <pc:sldMk cId="1077421182" sldId="256"/>
+            <ac:spMk id="24" creationId="{13A9E51D-DCEF-940C-7CD1-9AC6311F7C58}"/>
+          </ac:spMkLst>
+        </pc:spChg>
         <pc:spChg chg="add del mod">
           <ac:chgData name="Fatima Pillosu" userId="a6295d4dc9e22643" providerId="LiveId" clId="{19698738-8B30-4641-92DF-503FDCF97601}" dt="2025-07-04T14:41:42.468" v="1273" actId="21"/>
           <ac:spMkLst>
@@ -311,6 +431,14 @@
             <ac:spMk id="24" creationId="{E6165A3B-C495-5758-04F0-D44D9FCA46B1}"/>
           </ac:spMkLst>
         </pc:spChg>
+        <pc:spChg chg="mod">
+          <ac:chgData name="Fatima Pillosu" userId="a6295d4dc9e22643" providerId="LiveId" clId="{19698738-8B30-4641-92DF-503FDCF97601}" dt="2025-07-07T13:59:06.548" v="2370"/>
+          <ac:spMkLst>
+            <pc:docMk/>
+            <pc:sldMk cId="1077421182" sldId="256"/>
+            <ac:spMk id="25" creationId="{54F743EC-5032-BC9D-5F31-205A9040DAC3}"/>
+          </ac:spMkLst>
+        </pc:spChg>
         <pc:spChg chg="add del mod">
           <ac:chgData name="Fatima Pillosu" userId="a6295d4dc9e22643" providerId="LiveId" clId="{19698738-8B30-4641-92DF-503FDCF97601}" dt="2025-07-04T14:41:42.468" v="1273" actId="21"/>
           <ac:spMkLst>
@@ -325,6 +453,14 @@
             <pc:docMk/>
             <pc:sldMk cId="1077421182" sldId="256"/>
             <ac:spMk id="26" creationId="{0AD9D9CC-EC22-8091-0FC1-C84B991E16F9}"/>
+          </ac:spMkLst>
+        </pc:spChg>
+        <pc:spChg chg="mod">
+          <ac:chgData name="Fatima Pillosu" userId="a6295d4dc9e22643" providerId="LiveId" clId="{19698738-8B30-4641-92DF-503FDCF97601}" dt="2025-07-07T13:59:06.548" v="2370"/>
+          <ac:spMkLst>
+            <pc:docMk/>
+            <pc:sldMk cId="1077421182" sldId="256"/>
+            <ac:spMk id="27" creationId="{130E7E0B-852B-FCF8-F9A5-F7B5D7C18BFF}"/>
           </ac:spMkLst>
         </pc:spChg>
         <pc:spChg chg="add del mod">
@@ -439,6 +575,254 @@
             <ac:spMk id="40" creationId="{5488DDBC-D963-E04D-CC4D-C8A825978D60}"/>
           </ac:spMkLst>
         </pc:spChg>
+        <pc:spChg chg="mod">
+          <ac:chgData name="Fatima Pillosu" userId="a6295d4dc9e22643" providerId="LiveId" clId="{19698738-8B30-4641-92DF-503FDCF97601}" dt="2025-07-07T13:59:06.548" v="2370"/>
+          <ac:spMkLst>
+            <pc:docMk/>
+            <pc:sldMk cId="1077421182" sldId="256"/>
+            <ac:spMk id="41" creationId="{9EDB0BE9-975B-CD20-E6D6-2BEE52FF1B5D}"/>
+          </ac:spMkLst>
+        </pc:spChg>
+        <pc:spChg chg="mod">
+          <ac:chgData name="Fatima Pillosu" userId="a6295d4dc9e22643" providerId="LiveId" clId="{19698738-8B30-4641-92DF-503FDCF97601}" dt="2025-07-07T13:59:06.548" v="2370"/>
+          <ac:spMkLst>
+            <pc:docMk/>
+            <pc:sldMk cId="1077421182" sldId="256"/>
+            <ac:spMk id="43" creationId="{37598A7D-FF95-9518-97E1-D840660A93C0}"/>
+          </ac:spMkLst>
+        </pc:spChg>
+        <pc:spChg chg="mod">
+          <ac:chgData name="Fatima Pillosu" userId="a6295d4dc9e22643" providerId="LiveId" clId="{19698738-8B30-4641-92DF-503FDCF97601}" dt="2025-07-07T13:59:06.548" v="2370"/>
+          <ac:spMkLst>
+            <pc:docMk/>
+            <pc:sldMk cId="1077421182" sldId="256"/>
+            <ac:spMk id="44" creationId="{1880E6BA-F2FB-BDE3-4E9D-BAA5B296EDF0}"/>
+          </ac:spMkLst>
+        </pc:spChg>
+        <pc:spChg chg="mod">
+          <ac:chgData name="Fatima Pillosu" userId="a6295d4dc9e22643" providerId="LiveId" clId="{19698738-8B30-4641-92DF-503FDCF97601}" dt="2025-07-07T13:59:06.548" v="2370"/>
+          <ac:spMkLst>
+            <pc:docMk/>
+            <pc:sldMk cId="1077421182" sldId="256"/>
+            <ac:spMk id="46" creationId="{770EB013-7DEC-8A61-4A3D-9217817B7DB4}"/>
+          </ac:spMkLst>
+        </pc:spChg>
+        <pc:spChg chg="mod">
+          <ac:chgData name="Fatima Pillosu" userId="a6295d4dc9e22643" providerId="LiveId" clId="{19698738-8B30-4641-92DF-503FDCF97601}" dt="2025-07-07T13:59:06.548" v="2370"/>
+          <ac:spMkLst>
+            <pc:docMk/>
+            <pc:sldMk cId="1077421182" sldId="256"/>
+            <ac:spMk id="47" creationId="{9770D3A4-7202-5E21-0D8E-E313440CBA9C}"/>
+          </ac:spMkLst>
+        </pc:spChg>
+        <pc:spChg chg="mod">
+          <ac:chgData name="Fatima Pillosu" userId="a6295d4dc9e22643" providerId="LiveId" clId="{19698738-8B30-4641-92DF-503FDCF97601}" dt="2025-07-07T13:59:06.548" v="2370"/>
+          <ac:spMkLst>
+            <pc:docMk/>
+            <pc:sldMk cId="1077421182" sldId="256"/>
+            <ac:spMk id="49" creationId="{2F31622C-0496-386C-FD35-E3FB0E0DD93A}"/>
+          </ac:spMkLst>
+        </pc:spChg>
+        <pc:spChg chg="mod">
+          <ac:chgData name="Fatima Pillosu" userId="a6295d4dc9e22643" providerId="LiveId" clId="{19698738-8B30-4641-92DF-503FDCF97601}" dt="2025-07-07T13:59:06.548" v="2370"/>
+          <ac:spMkLst>
+            <pc:docMk/>
+            <pc:sldMk cId="1077421182" sldId="256"/>
+            <ac:spMk id="50" creationId="{69069D20-D07C-9037-AB7A-E478F7A51932}"/>
+          </ac:spMkLst>
+        </pc:spChg>
+        <pc:spChg chg="mod">
+          <ac:chgData name="Fatima Pillosu" userId="a6295d4dc9e22643" providerId="LiveId" clId="{19698738-8B30-4641-92DF-503FDCF97601}" dt="2025-07-07T13:59:06.548" v="2370"/>
+          <ac:spMkLst>
+            <pc:docMk/>
+            <pc:sldMk cId="1077421182" sldId="256"/>
+            <ac:spMk id="52" creationId="{9E22D21B-A82B-503E-95E9-AA62AB077F22}"/>
+          </ac:spMkLst>
+        </pc:spChg>
+        <pc:spChg chg="mod">
+          <ac:chgData name="Fatima Pillosu" userId="a6295d4dc9e22643" providerId="LiveId" clId="{19698738-8B30-4641-92DF-503FDCF97601}" dt="2025-07-07T13:59:06.548" v="2370"/>
+          <ac:spMkLst>
+            <pc:docMk/>
+            <pc:sldMk cId="1077421182" sldId="256"/>
+            <ac:spMk id="53" creationId="{26DD2596-F641-D3F2-8C13-F61691CAF3CD}"/>
+          </ac:spMkLst>
+        </pc:spChg>
+        <pc:spChg chg="mod">
+          <ac:chgData name="Fatima Pillosu" userId="a6295d4dc9e22643" providerId="LiveId" clId="{19698738-8B30-4641-92DF-503FDCF97601}" dt="2025-07-07T13:59:06.548" v="2370"/>
+          <ac:spMkLst>
+            <pc:docMk/>
+            <pc:sldMk cId="1077421182" sldId="256"/>
+            <ac:spMk id="55" creationId="{65362A44-7A6F-B9C9-7997-8D0A2F374EBE}"/>
+          </ac:spMkLst>
+        </pc:spChg>
+        <pc:spChg chg="mod">
+          <ac:chgData name="Fatima Pillosu" userId="a6295d4dc9e22643" providerId="LiveId" clId="{19698738-8B30-4641-92DF-503FDCF97601}" dt="2025-07-07T13:59:06.548" v="2370"/>
+          <ac:spMkLst>
+            <pc:docMk/>
+            <pc:sldMk cId="1077421182" sldId="256"/>
+            <ac:spMk id="56" creationId="{FDC0AD3D-1A84-4D12-2350-298FA48D8F7A}"/>
+          </ac:spMkLst>
+        </pc:spChg>
+        <pc:spChg chg="mod">
+          <ac:chgData name="Fatima Pillosu" userId="a6295d4dc9e22643" providerId="LiveId" clId="{19698738-8B30-4641-92DF-503FDCF97601}" dt="2025-07-07T13:59:06.548" v="2370"/>
+          <ac:spMkLst>
+            <pc:docMk/>
+            <pc:sldMk cId="1077421182" sldId="256"/>
+            <ac:spMk id="58" creationId="{FACC27C7-6D12-1013-ABBA-C896CA506250}"/>
+          </ac:spMkLst>
+        </pc:spChg>
+        <pc:spChg chg="mod">
+          <ac:chgData name="Fatima Pillosu" userId="a6295d4dc9e22643" providerId="LiveId" clId="{19698738-8B30-4641-92DF-503FDCF97601}" dt="2025-07-07T13:59:06.548" v="2370"/>
+          <ac:spMkLst>
+            <pc:docMk/>
+            <pc:sldMk cId="1077421182" sldId="256"/>
+            <ac:spMk id="59" creationId="{79DAD31B-B8D5-6AE0-C5BD-5E021FBBBC71}"/>
+          </ac:spMkLst>
+        </pc:spChg>
+        <pc:spChg chg="mod">
+          <ac:chgData name="Fatima Pillosu" userId="a6295d4dc9e22643" providerId="LiveId" clId="{19698738-8B30-4641-92DF-503FDCF97601}" dt="2025-07-07T13:59:06.548" v="2370"/>
+          <ac:spMkLst>
+            <pc:docMk/>
+            <pc:sldMk cId="1077421182" sldId="256"/>
+            <ac:spMk id="61" creationId="{FB60F46A-58EA-58C9-F6D7-E3D388D44083}"/>
+          </ac:spMkLst>
+        </pc:spChg>
+        <pc:spChg chg="mod">
+          <ac:chgData name="Fatima Pillosu" userId="a6295d4dc9e22643" providerId="LiveId" clId="{19698738-8B30-4641-92DF-503FDCF97601}" dt="2025-07-07T13:59:06.548" v="2370"/>
+          <ac:spMkLst>
+            <pc:docMk/>
+            <pc:sldMk cId="1077421182" sldId="256"/>
+            <ac:spMk id="62" creationId="{502362E7-832F-ABA3-6615-18CFC6FD5FAB}"/>
+          </ac:spMkLst>
+        </pc:spChg>
+        <pc:spChg chg="mod">
+          <ac:chgData name="Fatima Pillosu" userId="a6295d4dc9e22643" providerId="LiveId" clId="{19698738-8B30-4641-92DF-503FDCF97601}" dt="2025-07-07T13:59:06.548" v="2370"/>
+          <ac:spMkLst>
+            <pc:docMk/>
+            <pc:sldMk cId="1077421182" sldId="256"/>
+            <ac:spMk id="64" creationId="{68D7FA88-D154-4918-E50B-5715A02DF21E}"/>
+          </ac:spMkLst>
+        </pc:spChg>
+        <pc:spChg chg="mod">
+          <ac:chgData name="Fatima Pillosu" userId="a6295d4dc9e22643" providerId="LiveId" clId="{19698738-8B30-4641-92DF-503FDCF97601}" dt="2025-07-07T13:59:06.548" v="2370"/>
+          <ac:spMkLst>
+            <pc:docMk/>
+            <pc:sldMk cId="1077421182" sldId="256"/>
+            <ac:spMk id="65" creationId="{05F4BE14-5E2D-9A45-EDD1-F739B7D14832}"/>
+          </ac:spMkLst>
+        </pc:spChg>
+        <pc:spChg chg="mod">
+          <ac:chgData name="Fatima Pillosu" userId="a6295d4dc9e22643" providerId="LiveId" clId="{19698738-8B30-4641-92DF-503FDCF97601}" dt="2025-07-07T13:59:06.548" v="2370"/>
+          <ac:spMkLst>
+            <pc:docMk/>
+            <pc:sldMk cId="1077421182" sldId="256"/>
+            <ac:spMk id="68" creationId="{44939526-7468-A7B7-5B89-2007C764E458}"/>
+          </ac:spMkLst>
+        </pc:spChg>
+        <pc:spChg chg="mod">
+          <ac:chgData name="Fatima Pillosu" userId="a6295d4dc9e22643" providerId="LiveId" clId="{19698738-8B30-4641-92DF-503FDCF97601}" dt="2025-07-07T13:59:06.548" v="2370"/>
+          <ac:spMkLst>
+            <pc:docMk/>
+            <pc:sldMk cId="1077421182" sldId="256"/>
+            <ac:spMk id="70" creationId="{7DD7C053-9EBD-75EA-76D3-C80657A543FE}"/>
+          </ac:spMkLst>
+        </pc:spChg>
+        <pc:spChg chg="mod">
+          <ac:chgData name="Fatima Pillosu" userId="a6295d4dc9e22643" providerId="LiveId" clId="{19698738-8B30-4641-92DF-503FDCF97601}" dt="2025-07-07T13:59:06.548" v="2370"/>
+          <ac:spMkLst>
+            <pc:docMk/>
+            <pc:sldMk cId="1077421182" sldId="256"/>
+            <ac:spMk id="74" creationId="{257E3DA0-B59E-7DCC-A5B2-0973C22E5AAB}"/>
+          </ac:spMkLst>
+        </pc:spChg>
+        <pc:spChg chg="mod">
+          <ac:chgData name="Fatima Pillosu" userId="a6295d4dc9e22643" providerId="LiveId" clId="{19698738-8B30-4641-92DF-503FDCF97601}" dt="2025-07-07T13:59:06.548" v="2370"/>
+          <ac:spMkLst>
+            <pc:docMk/>
+            <pc:sldMk cId="1077421182" sldId="256"/>
+            <ac:spMk id="76" creationId="{7ECA1989-89DB-E611-4EEE-72E511C9D1F5}"/>
+          </ac:spMkLst>
+        </pc:spChg>
+        <pc:spChg chg="mod">
+          <ac:chgData name="Fatima Pillosu" userId="a6295d4dc9e22643" providerId="LiveId" clId="{19698738-8B30-4641-92DF-503FDCF97601}" dt="2025-07-07T13:59:06.548" v="2370"/>
+          <ac:spMkLst>
+            <pc:docMk/>
+            <pc:sldMk cId="1077421182" sldId="256"/>
+            <ac:spMk id="80" creationId="{EC3B9409-F0E8-ADF7-7C9A-8B355427CF99}"/>
+          </ac:spMkLst>
+        </pc:spChg>
+        <pc:spChg chg="mod">
+          <ac:chgData name="Fatima Pillosu" userId="a6295d4dc9e22643" providerId="LiveId" clId="{19698738-8B30-4641-92DF-503FDCF97601}" dt="2025-07-07T13:59:06.548" v="2370"/>
+          <ac:spMkLst>
+            <pc:docMk/>
+            <pc:sldMk cId="1077421182" sldId="256"/>
+            <ac:spMk id="82" creationId="{0AB36BDF-5A23-B483-651D-E8C7160B27F9}"/>
+          </ac:spMkLst>
+        </pc:spChg>
+        <pc:spChg chg="mod">
+          <ac:chgData name="Fatima Pillosu" userId="a6295d4dc9e22643" providerId="LiveId" clId="{19698738-8B30-4641-92DF-503FDCF97601}" dt="2025-07-07T13:59:06.548" v="2370"/>
+          <ac:spMkLst>
+            <pc:docMk/>
+            <pc:sldMk cId="1077421182" sldId="256"/>
+            <ac:spMk id="86" creationId="{B9AFEDB8-D935-976A-4635-6D243D5AD275}"/>
+          </ac:spMkLst>
+        </pc:spChg>
+        <pc:spChg chg="mod">
+          <ac:chgData name="Fatima Pillosu" userId="a6295d4dc9e22643" providerId="LiveId" clId="{19698738-8B30-4641-92DF-503FDCF97601}" dt="2025-07-07T13:59:06.548" v="2370"/>
+          <ac:spMkLst>
+            <pc:docMk/>
+            <pc:sldMk cId="1077421182" sldId="256"/>
+            <ac:spMk id="88" creationId="{0E057C5B-551D-693B-0E77-CD6F253E5C61}"/>
+          </ac:spMkLst>
+        </pc:spChg>
+        <pc:spChg chg="mod">
+          <ac:chgData name="Fatima Pillosu" userId="a6295d4dc9e22643" providerId="LiveId" clId="{19698738-8B30-4641-92DF-503FDCF97601}" dt="2025-07-07T13:59:06.548" v="2370"/>
+          <ac:spMkLst>
+            <pc:docMk/>
+            <pc:sldMk cId="1077421182" sldId="256"/>
+            <ac:spMk id="92" creationId="{61E48108-8734-B775-67E5-90F64B3BDE7B}"/>
+          </ac:spMkLst>
+        </pc:spChg>
+        <pc:spChg chg="mod">
+          <ac:chgData name="Fatima Pillosu" userId="a6295d4dc9e22643" providerId="LiveId" clId="{19698738-8B30-4641-92DF-503FDCF97601}" dt="2025-07-07T13:59:06.548" v="2370"/>
+          <ac:spMkLst>
+            <pc:docMk/>
+            <pc:sldMk cId="1077421182" sldId="256"/>
+            <ac:spMk id="94" creationId="{A98BA35E-620C-6181-D52A-42C047486931}"/>
+          </ac:spMkLst>
+        </pc:spChg>
+        <pc:spChg chg="mod">
+          <ac:chgData name="Fatima Pillosu" userId="a6295d4dc9e22643" providerId="LiveId" clId="{19698738-8B30-4641-92DF-503FDCF97601}" dt="2025-07-07T13:59:06.548" v="2370"/>
+          <ac:spMkLst>
+            <pc:docMk/>
+            <pc:sldMk cId="1077421182" sldId="256"/>
+            <ac:spMk id="98" creationId="{40EC0B94-FC3D-5F55-E23D-CFEEB2FD3B12}"/>
+          </ac:spMkLst>
+        </pc:spChg>
+        <pc:spChg chg="mod">
+          <ac:chgData name="Fatima Pillosu" userId="a6295d4dc9e22643" providerId="LiveId" clId="{19698738-8B30-4641-92DF-503FDCF97601}" dt="2025-07-07T13:59:06.548" v="2370"/>
+          <ac:spMkLst>
+            <pc:docMk/>
+            <pc:sldMk cId="1077421182" sldId="256"/>
+            <ac:spMk id="100" creationId="{50834067-1769-D239-47BA-25DD32455FE2}"/>
+          </ac:spMkLst>
+        </pc:spChg>
+        <pc:spChg chg="mod">
+          <ac:chgData name="Fatima Pillosu" userId="a6295d4dc9e22643" providerId="LiveId" clId="{19698738-8B30-4641-92DF-503FDCF97601}" dt="2025-07-07T13:59:06.548" v="2370"/>
+          <ac:spMkLst>
+            <pc:docMk/>
+            <pc:sldMk cId="1077421182" sldId="256"/>
+            <ac:spMk id="104" creationId="{25506910-7CA7-8883-0A19-A896F88D8503}"/>
+          </ac:spMkLst>
+        </pc:spChg>
+        <pc:spChg chg="mod">
+          <ac:chgData name="Fatima Pillosu" userId="a6295d4dc9e22643" providerId="LiveId" clId="{19698738-8B30-4641-92DF-503FDCF97601}" dt="2025-07-07T13:59:06.548" v="2370"/>
+          <ac:spMkLst>
+            <pc:docMk/>
+            <pc:sldMk cId="1077421182" sldId="256"/>
+            <ac:spMk id="106" creationId="{CFE32841-6022-5F8E-818A-43EA47E9FB89}"/>
+          </ac:spMkLst>
+        </pc:spChg>
         <pc:spChg chg="add mod">
           <ac:chgData name="Fatima Pillosu" userId="a6295d4dc9e22643" providerId="LiveId" clId="{19698738-8B30-4641-92DF-503FDCF97601}" dt="2025-07-04T15:43:38.194" v="2292" actId="1036"/>
           <ac:spMkLst>
@@ -1231,6 +1615,198 @@
             <ac:spMk id="248" creationId="{D1CC269C-E046-1461-647C-701AADFCA15B}"/>
           </ac:spMkLst>
         </pc:spChg>
+        <pc:grpChg chg="add mod">
+          <ac:chgData name="Fatima Pillosu" userId="a6295d4dc9e22643" providerId="LiveId" clId="{19698738-8B30-4641-92DF-503FDCF97601}" dt="2025-07-07T14:00:08.919" v="2441" actId="1036"/>
+          <ac:grpSpMkLst>
+            <pc:docMk/>
+            <pc:sldMk cId="1077421182" sldId="256"/>
+            <ac:grpSpMk id="2" creationId="{87D2CDBC-D0DF-68AA-82F7-5A8A162F2021}"/>
+          </ac:grpSpMkLst>
+        </pc:grpChg>
+        <pc:grpChg chg="add mod">
+          <ac:chgData name="Fatima Pillosu" userId="a6295d4dc9e22643" providerId="LiveId" clId="{19698738-8B30-4641-92DF-503FDCF97601}" dt="2025-07-07T13:59:48.741" v="2437" actId="1037"/>
+          <ac:grpSpMkLst>
+            <pc:docMk/>
+            <pc:sldMk cId="1077421182" sldId="256"/>
+            <ac:grpSpMk id="5" creationId="{359DAEA3-5020-CA78-7D25-6097EDDD23EE}"/>
+          </ac:grpSpMkLst>
+        </pc:grpChg>
+        <pc:grpChg chg="add mod">
+          <ac:chgData name="Fatima Pillosu" userId="a6295d4dc9e22643" providerId="LiveId" clId="{19698738-8B30-4641-92DF-503FDCF97601}" dt="2025-07-07T13:59:48.741" v="2437" actId="1037"/>
+          <ac:grpSpMkLst>
+            <pc:docMk/>
+            <pc:sldMk cId="1077421182" sldId="256"/>
+            <ac:grpSpMk id="8" creationId="{649BE6E0-26A6-086C-6F27-49A7D37AEA70}"/>
+          </ac:grpSpMkLst>
+        </pc:grpChg>
+        <pc:grpChg chg="add mod">
+          <ac:chgData name="Fatima Pillosu" userId="a6295d4dc9e22643" providerId="LiveId" clId="{19698738-8B30-4641-92DF-503FDCF97601}" dt="2025-07-07T13:59:48.741" v="2437" actId="1037"/>
+          <ac:grpSpMkLst>
+            <pc:docMk/>
+            <pc:sldMk cId="1077421182" sldId="256"/>
+            <ac:grpSpMk id="11" creationId="{9BC8FB17-F955-CC33-A429-629274941814}"/>
+          </ac:grpSpMkLst>
+        </pc:grpChg>
+        <pc:grpChg chg="add mod">
+          <ac:chgData name="Fatima Pillosu" userId="a6295d4dc9e22643" providerId="LiveId" clId="{19698738-8B30-4641-92DF-503FDCF97601}" dt="2025-07-07T13:59:48.741" v="2437" actId="1037"/>
+          <ac:grpSpMkLst>
+            <pc:docMk/>
+            <pc:sldMk cId="1077421182" sldId="256"/>
+            <ac:grpSpMk id="14" creationId="{6E47BAAF-2795-52F1-75D4-7FE36346F781}"/>
+          </ac:grpSpMkLst>
+        </pc:grpChg>
+        <pc:grpChg chg="add mod">
+          <ac:chgData name="Fatima Pillosu" userId="a6295d4dc9e22643" providerId="LiveId" clId="{19698738-8B30-4641-92DF-503FDCF97601}" dt="2025-07-07T13:59:58.007" v="2438" actId="555"/>
+          <ac:grpSpMkLst>
+            <pc:docMk/>
+            <pc:sldMk cId="1077421182" sldId="256"/>
+            <ac:grpSpMk id="17" creationId="{349B1FF6-A37B-1692-3781-4638D6ED5B93}"/>
+          </ac:grpSpMkLst>
+        </pc:grpChg>
+        <pc:grpChg chg="add mod">
+          <ac:chgData name="Fatima Pillosu" userId="a6295d4dc9e22643" providerId="LiveId" clId="{19698738-8B30-4641-92DF-503FDCF97601}" dt="2025-07-07T14:00:19.443" v="2445" actId="553"/>
+          <ac:grpSpMkLst>
+            <pc:docMk/>
+            <pc:sldMk cId="1077421182" sldId="256"/>
+            <ac:grpSpMk id="20" creationId="{F78F5CF6-F9F6-5DC4-EC05-5C4D80B9AD25}"/>
+          </ac:grpSpMkLst>
+        </pc:grpChg>
+        <pc:grpChg chg="add mod">
+          <ac:chgData name="Fatima Pillosu" userId="a6295d4dc9e22643" providerId="LiveId" clId="{19698738-8B30-4641-92DF-503FDCF97601}" dt="2025-07-07T14:00:22.890" v="2446" actId="465"/>
+          <ac:grpSpMkLst>
+            <pc:docMk/>
+            <pc:sldMk cId="1077421182" sldId="256"/>
+            <ac:grpSpMk id="23" creationId="{94C5419E-44A6-D295-901B-C470EB8846ED}"/>
+          </ac:grpSpMkLst>
+        </pc:grpChg>
+        <pc:grpChg chg="add mod">
+          <ac:chgData name="Fatima Pillosu" userId="a6295d4dc9e22643" providerId="LiveId" clId="{19698738-8B30-4641-92DF-503FDCF97601}" dt="2025-07-07T14:00:22.890" v="2446" actId="465"/>
+          <ac:grpSpMkLst>
+            <pc:docMk/>
+            <pc:sldMk cId="1077421182" sldId="256"/>
+            <ac:grpSpMk id="26" creationId="{CC198BBF-9E34-46AB-56CC-DBB007491D17}"/>
+          </ac:grpSpMkLst>
+        </pc:grpChg>
+        <pc:grpChg chg="add mod">
+          <ac:chgData name="Fatima Pillosu" userId="a6295d4dc9e22643" providerId="LiveId" clId="{19698738-8B30-4641-92DF-503FDCF97601}" dt="2025-07-07T14:00:22.890" v="2446" actId="465"/>
+          <ac:grpSpMkLst>
+            <pc:docMk/>
+            <pc:sldMk cId="1077421182" sldId="256"/>
+            <ac:grpSpMk id="42" creationId="{52630040-975D-FC19-467F-63E7A1126C52}"/>
+          </ac:grpSpMkLst>
+        </pc:grpChg>
+        <pc:grpChg chg="add mod">
+          <ac:chgData name="Fatima Pillosu" userId="a6295d4dc9e22643" providerId="LiveId" clId="{19698738-8B30-4641-92DF-503FDCF97601}" dt="2025-07-07T14:00:22.890" v="2446" actId="465"/>
+          <ac:grpSpMkLst>
+            <pc:docMk/>
+            <pc:sldMk cId="1077421182" sldId="256"/>
+            <ac:grpSpMk id="45" creationId="{C4C37508-735C-D058-6A46-489E980C434A}"/>
+          </ac:grpSpMkLst>
+        </pc:grpChg>
+        <pc:grpChg chg="add mod">
+          <ac:chgData name="Fatima Pillosu" userId="a6295d4dc9e22643" providerId="LiveId" clId="{19698738-8B30-4641-92DF-503FDCF97601}" dt="2025-07-07T14:00:19.443" v="2445" actId="553"/>
+          <ac:grpSpMkLst>
+            <pc:docMk/>
+            <pc:sldMk cId="1077421182" sldId="256"/>
+            <ac:grpSpMk id="48" creationId="{653A994E-AE79-3353-8749-39F903538B98}"/>
+          </ac:grpSpMkLst>
+        </pc:grpChg>
+        <pc:grpChg chg="add mod">
+          <ac:chgData name="Fatima Pillosu" userId="a6295d4dc9e22643" providerId="LiveId" clId="{19698738-8B30-4641-92DF-503FDCF97601}" dt="2025-07-07T14:01:15.383" v="2487" actId="1035"/>
+          <ac:grpSpMkLst>
+            <pc:docMk/>
+            <pc:sldMk cId="1077421182" sldId="256"/>
+            <ac:grpSpMk id="51" creationId="{CD588A81-05D0-CCF8-7567-448AE67659DE}"/>
+          </ac:grpSpMkLst>
+        </pc:grpChg>
+        <pc:grpChg chg="add mod">
+          <ac:chgData name="Fatima Pillosu" userId="a6295d4dc9e22643" providerId="LiveId" clId="{19698738-8B30-4641-92DF-503FDCF97601}" dt="2025-07-07T14:01:15.383" v="2487" actId="1035"/>
+          <ac:grpSpMkLst>
+            <pc:docMk/>
+            <pc:sldMk cId="1077421182" sldId="256"/>
+            <ac:grpSpMk id="54" creationId="{D3956476-047C-5356-E441-988316C1C0D9}"/>
+          </ac:grpSpMkLst>
+        </pc:grpChg>
+        <pc:grpChg chg="add mod">
+          <ac:chgData name="Fatima Pillosu" userId="a6295d4dc9e22643" providerId="LiveId" clId="{19698738-8B30-4641-92DF-503FDCF97601}" dt="2025-07-07T14:01:15.383" v="2487" actId="1035"/>
+          <ac:grpSpMkLst>
+            <pc:docMk/>
+            <pc:sldMk cId="1077421182" sldId="256"/>
+            <ac:grpSpMk id="57" creationId="{6F892770-CE53-DD78-D5BB-03ECF901DC01}"/>
+          </ac:grpSpMkLst>
+        </pc:grpChg>
+        <pc:grpChg chg="add mod">
+          <ac:chgData name="Fatima Pillosu" userId="a6295d4dc9e22643" providerId="LiveId" clId="{19698738-8B30-4641-92DF-503FDCF97601}" dt="2025-07-07T14:01:15.383" v="2487" actId="1035"/>
+          <ac:grpSpMkLst>
+            <pc:docMk/>
+            <pc:sldMk cId="1077421182" sldId="256"/>
+            <ac:grpSpMk id="60" creationId="{D378A3A7-AAE7-AB6B-8325-9765A852F80F}"/>
+          </ac:grpSpMkLst>
+        </pc:grpChg>
+        <pc:grpChg chg="add mod">
+          <ac:chgData name="Fatima Pillosu" userId="a6295d4dc9e22643" providerId="LiveId" clId="{19698738-8B30-4641-92DF-503FDCF97601}" dt="2025-07-07T14:01:15.383" v="2487" actId="1035"/>
+          <ac:grpSpMkLst>
+            <pc:docMk/>
+            <pc:sldMk cId="1077421182" sldId="256"/>
+            <ac:grpSpMk id="63" creationId="{BDE97180-8A29-C88B-B311-50C7B4019697}"/>
+          </ac:grpSpMkLst>
+        </pc:grpChg>
+        <pc:grpChg chg="add mod">
+          <ac:chgData name="Fatima Pillosu" userId="a6295d4dc9e22643" providerId="LiveId" clId="{19698738-8B30-4641-92DF-503FDCF97601}" dt="2025-07-07T14:01:15.383" v="2487" actId="1035"/>
+          <ac:grpSpMkLst>
+            <pc:docMk/>
+            <pc:sldMk cId="1077421182" sldId="256"/>
+            <ac:grpSpMk id="66" creationId="{790A4AB4-7F81-314A-FA70-34C0CD0DFD61}"/>
+          </ac:grpSpMkLst>
+        </pc:grpChg>
+        <pc:grpChg chg="add mod">
+          <ac:chgData name="Fatima Pillosu" userId="a6295d4dc9e22643" providerId="LiveId" clId="{19698738-8B30-4641-92DF-503FDCF97601}" dt="2025-07-07T14:01:15.383" v="2487" actId="1035"/>
+          <ac:grpSpMkLst>
+            <pc:docMk/>
+            <pc:sldMk cId="1077421182" sldId="256"/>
+            <ac:grpSpMk id="72" creationId="{1EDBFB11-5188-9FC6-50C8-E2569BBB14ED}"/>
+          </ac:grpSpMkLst>
+        </pc:grpChg>
+        <pc:grpChg chg="add mod">
+          <ac:chgData name="Fatima Pillosu" userId="a6295d4dc9e22643" providerId="LiveId" clId="{19698738-8B30-4641-92DF-503FDCF97601}" dt="2025-07-07T14:01:15.383" v="2487" actId="1035"/>
+          <ac:grpSpMkLst>
+            <pc:docMk/>
+            <pc:sldMk cId="1077421182" sldId="256"/>
+            <ac:grpSpMk id="78" creationId="{3D63ABEF-BBCE-6F9A-18D1-CC4AE41DAE26}"/>
+          </ac:grpSpMkLst>
+        </pc:grpChg>
+        <pc:grpChg chg="add mod">
+          <ac:chgData name="Fatima Pillosu" userId="a6295d4dc9e22643" providerId="LiveId" clId="{19698738-8B30-4641-92DF-503FDCF97601}" dt="2025-07-07T14:01:15.383" v="2487" actId="1035"/>
+          <ac:grpSpMkLst>
+            <pc:docMk/>
+            <pc:sldMk cId="1077421182" sldId="256"/>
+            <ac:grpSpMk id="84" creationId="{9856C7DD-5D2B-9057-4BDA-C9B1ABE8426E}"/>
+          </ac:grpSpMkLst>
+        </pc:grpChg>
+        <pc:grpChg chg="add mod">
+          <ac:chgData name="Fatima Pillosu" userId="a6295d4dc9e22643" providerId="LiveId" clId="{19698738-8B30-4641-92DF-503FDCF97601}" dt="2025-07-07T14:01:15.383" v="2487" actId="1035"/>
+          <ac:grpSpMkLst>
+            <pc:docMk/>
+            <pc:sldMk cId="1077421182" sldId="256"/>
+            <ac:grpSpMk id="90" creationId="{A24E96C9-7A45-BC3E-F02D-7303E1E9BBB2}"/>
+          </ac:grpSpMkLst>
+        </pc:grpChg>
+        <pc:grpChg chg="add mod">
+          <ac:chgData name="Fatima Pillosu" userId="a6295d4dc9e22643" providerId="LiveId" clId="{19698738-8B30-4641-92DF-503FDCF97601}" dt="2025-07-07T14:01:15.383" v="2487" actId="1035"/>
+          <ac:grpSpMkLst>
+            <pc:docMk/>
+            <pc:sldMk cId="1077421182" sldId="256"/>
+            <ac:grpSpMk id="96" creationId="{1F582236-5FFE-D0AF-6BC2-25714F273B5D}"/>
+          </ac:grpSpMkLst>
+        </pc:grpChg>
+        <pc:grpChg chg="add mod">
+          <ac:chgData name="Fatima Pillosu" userId="a6295d4dc9e22643" providerId="LiveId" clId="{19698738-8B30-4641-92DF-503FDCF97601}" dt="2025-07-07T14:01:15.383" v="2487" actId="1035"/>
+          <ac:grpSpMkLst>
+            <pc:docMk/>
+            <pc:sldMk cId="1077421182" sldId="256"/>
+            <ac:grpSpMk id="102" creationId="{BAD1792E-49D2-AE6D-FD4E-85776A04D127}"/>
+          </ac:grpSpMkLst>
+        </pc:grpChg>
         <pc:picChg chg="add del mod">
           <ac:chgData name="Fatima Pillosu" userId="a6295d4dc9e22643" providerId="LiveId" clId="{19698738-8B30-4641-92DF-503FDCF97601}" dt="2025-07-04T14:39:22.698" v="1177" actId="478"/>
           <ac:picMkLst>
@@ -6423,7 +6999,7 @@
           <a:p>
             <a:fld id="{F0820250-0589-45C6-A87F-3E34BBC48915}" type="datetimeFigureOut">
               <a:rPr lang="en-GB" smtClean="0"/>
-              <a:t>04/07/2025</a:t>
+              <a:t>07/07/2025</a:t>
             </a:fld>
             <a:endParaRPr lang="en-GB"/>
           </a:p>
@@ -6593,7 +7169,7 @@
           <a:p>
             <a:fld id="{F0820250-0589-45C6-A87F-3E34BBC48915}" type="datetimeFigureOut">
               <a:rPr lang="en-GB" smtClean="0"/>
-              <a:t>04/07/2025</a:t>
+              <a:t>07/07/2025</a:t>
             </a:fld>
             <a:endParaRPr lang="en-GB"/>
           </a:p>
@@ -6773,7 +7349,7 @@
           <a:p>
             <a:fld id="{F0820250-0589-45C6-A87F-3E34BBC48915}" type="datetimeFigureOut">
               <a:rPr lang="en-GB" smtClean="0"/>
-              <a:t>04/07/2025</a:t>
+              <a:t>07/07/2025</a:t>
             </a:fld>
             <a:endParaRPr lang="en-GB"/>
           </a:p>
@@ -6943,7 +7519,7 @@
           <a:p>
             <a:fld id="{F0820250-0589-45C6-A87F-3E34BBC48915}" type="datetimeFigureOut">
               <a:rPr lang="en-GB" smtClean="0"/>
-              <a:t>04/07/2025</a:t>
+              <a:t>07/07/2025</a:t>
             </a:fld>
             <a:endParaRPr lang="en-GB"/>
           </a:p>
@@ -7189,7 +7765,7 @@
           <a:p>
             <a:fld id="{F0820250-0589-45C6-A87F-3E34BBC48915}" type="datetimeFigureOut">
               <a:rPr lang="en-GB" smtClean="0"/>
-              <a:t>04/07/2025</a:t>
+              <a:t>07/07/2025</a:t>
             </a:fld>
             <a:endParaRPr lang="en-GB"/>
           </a:p>
@@ -7421,7 +7997,7 @@
           <a:p>
             <a:fld id="{F0820250-0589-45C6-A87F-3E34BBC48915}" type="datetimeFigureOut">
               <a:rPr lang="en-GB" smtClean="0"/>
-              <a:t>04/07/2025</a:t>
+              <a:t>07/07/2025</a:t>
             </a:fld>
             <a:endParaRPr lang="en-GB"/>
           </a:p>
@@ -7788,7 +8364,7 @@
           <a:p>
             <a:fld id="{F0820250-0589-45C6-A87F-3E34BBC48915}" type="datetimeFigureOut">
               <a:rPr lang="en-GB" smtClean="0"/>
-              <a:t>04/07/2025</a:t>
+              <a:t>07/07/2025</a:t>
             </a:fld>
             <a:endParaRPr lang="en-GB"/>
           </a:p>
@@ -7906,7 +8482,7 @@
           <a:p>
             <a:fld id="{F0820250-0589-45C6-A87F-3E34BBC48915}" type="datetimeFigureOut">
               <a:rPr lang="en-GB" smtClean="0"/>
-              <a:t>04/07/2025</a:t>
+              <a:t>07/07/2025</a:t>
             </a:fld>
             <a:endParaRPr lang="en-GB"/>
           </a:p>
@@ -8001,7 +8577,7 @@
           <a:p>
             <a:fld id="{F0820250-0589-45C6-A87F-3E34BBC48915}" type="datetimeFigureOut">
               <a:rPr lang="en-GB" smtClean="0"/>
-              <a:t>04/07/2025</a:t>
+              <a:t>07/07/2025</a:t>
             </a:fld>
             <a:endParaRPr lang="en-GB"/>
           </a:p>
@@ -8278,7 +8854,7 @@
           <a:p>
             <a:fld id="{F0820250-0589-45C6-A87F-3E34BBC48915}" type="datetimeFigureOut">
               <a:rPr lang="en-GB" smtClean="0"/>
-              <a:t>04/07/2025</a:t>
+              <a:t>07/07/2025</a:t>
             </a:fld>
             <a:endParaRPr lang="en-GB"/>
           </a:p>
@@ -8535,7 +9111,7 @@
           <a:p>
             <a:fld id="{F0820250-0589-45C6-A87F-3E34BBC48915}" type="datetimeFigureOut">
               <a:rPr lang="en-GB" smtClean="0"/>
-              <a:t>04/07/2025</a:t>
+              <a:t>07/07/2025</a:t>
             </a:fld>
             <a:endParaRPr lang="en-GB"/>
           </a:p>
@@ -8748,7 +9324,7 @@
           <a:p>
             <a:fld id="{F0820250-0589-45C6-A87F-3E34BBC48915}" type="datetimeFigureOut">
               <a:rPr lang="en-GB" smtClean="0"/>
-              <a:t>04/07/2025</a:t>
+              <a:t>07/07/2025</a:t>
             </a:fld>
             <a:endParaRPr lang="en-GB"/>
           </a:p>
@@ -11595,6 +12171,2838 @@
           </a:p>
         </p:txBody>
       </p:sp>
+      <p:grpSp>
+        <p:nvGrpSpPr>
+          <p:cNvPr id="2" name="Group 1">
+            <a:extLst>
+              <a:ext uri="{FF2B5EF4-FFF2-40B4-BE49-F238E27FC236}">
+                <a16:creationId xmlns:a16="http://schemas.microsoft.com/office/drawing/2014/main" id="{87D2CDBC-D0DF-68AA-82F7-5A8A162F2021}"/>
+              </a:ext>
+            </a:extLst>
+          </p:cNvPr>
+          <p:cNvGrpSpPr/>
+          <p:nvPr/>
+        </p:nvGrpSpPr>
+        <p:grpSpPr>
+          <a:xfrm>
+            <a:off x="1022685" y="1256005"/>
+            <a:ext cx="216000" cy="216000"/>
+            <a:chOff x="1002190" y="1572253"/>
+            <a:chExt cx="216000" cy="216000"/>
+          </a:xfrm>
+        </p:grpSpPr>
+        <p:sp>
+          <p:nvSpPr>
+            <p:cNvPr id="3" name="TextBox 2">
+              <a:extLst>
+                <a:ext uri="{FF2B5EF4-FFF2-40B4-BE49-F238E27FC236}">
+                  <a16:creationId xmlns:a16="http://schemas.microsoft.com/office/drawing/2014/main" id="{AD3D64D7-A2FC-1830-076B-361358412A47}"/>
+                </a:ext>
+              </a:extLst>
+            </p:cNvPr>
+            <p:cNvSpPr txBox="1"/>
+            <p:nvPr/>
+          </p:nvSpPr>
+          <p:spPr>
+            <a:xfrm>
+              <a:off x="1002190" y="1572253"/>
+              <a:ext cx="216000" cy="216000"/>
+            </a:xfrm>
+            <a:prstGeom prst="rect">
+              <a:avLst/>
+            </a:prstGeom>
+            <a:noFill/>
+          </p:spPr>
+          <p:txBody>
+            <a:bodyPr wrap="square" rtlCol="0">
+              <a:spAutoFit/>
+            </a:bodyPr>
+            <a:lstStyle/>
+            <a:p>
+              <a:r>
+                <a:rPr lang="en-US" sz="800" dirty="0">
+                  <a:latin typeface="Calibri" panose="020F0502020204030204" pitchFamily="34" charset="0"/>
+                  <a:cs typeface="Calibri" panose="020F0502020204030204" pitchFamily="34" charset="0"/>
+                </a:rPr>
+                <a:t>a</a:t>
+              </a:r>
+              <a:endParaRPr lang="en-GB" sz="800" dirty="0">
+                <a:latin typeface="Calibri" panose="020F0502020204030204" pitchFamily="34" charset="0"/>
+                <a:cs typeface="Calibri" panose="020F0502020204030204" pitchFamily="34" charset="0"/>
+              </a:endParaRPr>
+            </a:p>
+          </p:txBody>
+        </p:sp>
+        <p:sp>
+          <p:nvSpPr>
+            <p:cNvPr id="4" name="Rectangle 3">
+              <a:extLst>
+                <a:ext uri="{FF2B5EF4-FFF2-40B4-BE49-F238E27FC236}">
+                  <a16:creationId xmlns:a16="http://schemas.microsoft.com/office/drawing/2014/main" id="{7895D96C-416F-0634-EDE0-2DC459727B5C}"/>
+                </a:ext>
+              </a:extLst>
+            </p:cNvPr>
+            <p:cNvSpPr/>
+            <p:nvPr/>
+          </p:nvSpPr>
+          <p:spPr>
+            <a:xfrm>
+              <a:off x="1040747" y="1619373"/>
+              <a:ext cx="144000" cy="144000"/>
+            </a:xfrm>
+            <a:prstGeom prst="rect">
+              <a:avLst/>
+            </a:prstGeom>
+            <a:noFill/>
+            <a:ln w="3175">
+              <a:solidFill>
+                <a:schemeClr val="tx1">
+                  <a:lumMod val="75000"/>
+                  <a:lumOff val="25000"/>
+                </a:schemeClr>
+              </a:solidFill>
+            </a:ln>
+          </p:spPr>
+          <p:style>
+            <a:lnRef idx="2">
+              <a:schemeClr val="accent1">
+                <a:shade val="15000"/>
+              </a:schemeClr>
+            </a:lnRef>
+            <a:fillRef idx="1">
+              <a:schemeClr val="accent1"/>
+            </a:fillRef>
+            <a:effectRef idx="0">
+              <a:schemeClr val="accent1"/>
+            </a:effectRef>
+            <a:fontRef idx="minor">
+              <a:schemeClr val="lt1"/>
+            </a:fontRef>
+          </p:style>
+          <p:txBody>
+            <a:bodyPr rtlCol="0" anchor="ctr"/>
+            <a:lstStyle/>
+            <a:p>
+              <a:pPr algn="ctr"/>
+              <a:endParaRPr lang="en-GB"/>
+            </a:p>
+          </p:txBody>
+        </p:sp>
+      </p:grpSp>
+      <p:grpSp>
+        <p:nvGrpSpPr>
+          <p:cNvPr id="5" name="Group 4">
+            <a:extLst>
+              <a:ext uri="{FF2B5EF4-FFF2-40B4-BE49-F238E27FC236}">
+                <a16:creationId xmlns:a16="http://schemas.microsoft.com/office/drawing/2014/main" id="{359DAEA3-5020-CA78-7D25-6097EDDD23EE}"/>
+              </a:ext>
+            </a:extLst>
+          </p:cNvPr>
+          <p:cNvGrpSpPr/>
+          <p:nvPr/>
+        </p:nvGrpSpPr>
+        <p:grpSpPr>
+          <a:xfrm>
+            <a:off x="1022685" y="2232424"/>
+            <a:ext cx="216000" cy="216000"/>
+            <a:chOff x="1002190" y="1572253"/>
+            <a:chExt cx="216000" cy="216000"/>
+          </a:xfrm>
+        </p:grpSpPr>
+        <p:sp>
+          <p:nvSpPr>
+            <p:cNvPr id="6" name="TextBox 5">
+              <a:extLst>
+                <a:ext uri="{FF2B5EF4-FFF2-40B4-BE49-F238E27FC236}">
+                  <a16:creationId xmlns:a16="http://schemas.microsoft.com/office/drawing/2014/main" id="{A82F9947-706C-C8E9-E039-0F8C98F44272}"/>
+                </a:ext>
+              </a:extLst>
+            </p:cNvPr>
+            <p:cNvSpPr txBox="1"/>
+            <p:nvPr/>
+          </p:nvSpPr>
+          <p:spPr>
+            <a:xfrm>
+              <a:off x="1002190" y="1572253"/>
+              <a:ext cx="216000" cy="216000"/>
+            </a:xfrm>
+            <a:prstGeom prst="rect">
+              <a:avLst/>
+            </a:prstGeom>
+            <a:noFill/>
+          </p:spPr>
+          <p:txBody>
+            <a:bodyPr wrap="square" rtlCol="0">
+              <a:spAutoFit/>
+            </a:bodyPr>
+            <a:lstStyle/>
+            <a:p>
+              <a:r>
+                <a:rPr lang="en-US" sz="800" dirty="0">
+                  <a:latin typeface="Calibri" panose="020F0502020204030204" pitchFamily="34" charset="0"/>
+                  <a:cs typeface="Calibri" panose="020F0502020204030204" pitchFamily="34" charset="0"/>
+                </a:rPr>
+                <a:t>b</a:t>
+              </a:r>
+              <a:endParaRPr lang="en-GB" sz="800" dirty="0">
+                <a:latin typeface="Calibri" panose="020F0502020204030204" pitchFamily="34" charset="0"/>
+                <a:cs typeface="Calibri" panose="020F0502020204030204" pitchFamily="34" charset="0"/>
+              </a:endParaRPr>
+            </a:p>
+          </p:txBody>
+        </p:sp>
+        <p:sp>
+          <p:nvSpPr>
+            <p:cNvPr id="7" name="Rectangle 6">
+              <a:extLst>
+                <a:ext uri="{FF2B5EF4-FFF2-40B4-BE49-F238E27FC236}">
+                  <a16:creationId xmlns:a16="http://schemas.microsoft.com/office/drawing/2014/main" id="{7C57723D-332E-1D30-41C6-AC1A6C726819}"/>
+                </a:ext>
+              </a:extLst>
+            </p:cNvPr>
+            <p:cNvSpPr/>
+            <p:nvPr/>
+          </p:nvSpPr>
+          <p:spPr>
+            <a:xfrm>
+              <a:off x="1040747" y="1619373"/>
+              <a:ext cx="144000" cy="144000"/>
+            </a:xfrm>
+            <a:prstGeom prst="rect">
+              <a:avLst/>
+            </a:prstGeom>
+            <a:noFill/>
+            <a:ln w="3175">
+              <a:solidFill>
+                <a:schemeClr val="tx1">
+                  <a:lumMod val="75000"/>
+                  <a:lumOff val="25000"/>
+                </a:schemeClr>
+              </a:solidFill>
+            </a:ln>
+          </p:spPr>
+          <p:style>
+            <a:lnRef idx="2">
+              <a:schemeClr val="accent1">
+                <a:shade val="15000"/>
+              </a:schemeClr>
+            </a:lnRef>
+            <a:fillRef idx="1">
+              <a:schemeClr val="accent1"/>
+            </a:fillRef>
+            <a:effectRef idx="0">
+              <a:schemeClr val="accent1"/>
+            </a:effectRef>
+            <a:fontRef idx="minor">
+              <a:schemeClr val="lt1"/>
+            </a:fontRef>
+          </p:style>
+          <p:txBody>
+            <a:bodyPr rtlCol="0" anchor="ctr"/>
+            <a:lstStyle/>
+            <a:p>
+              <a:pPr algn="ctr"/>
+              <a:endParaRPr lang="en-GB"/>
+            </a:p>
+          </p:txBody>
+        </p:sp>
+      </p:grpSp>
+      <p:grpSp>
+        <p:nvGrpSpPr>
+          <p:cNvPr id="8" name="Group 7">
+            <a:extLst>
+              <a:ext uri="{FF2B5EF4-FFF2-40B4-BE49-F238E27FC236}">
+                <a16:creationId xmlns:a16="http://schemas.microsoft.com/office/drawing/2014/main" id="{649BE6E0-26A6-086C-6F27-49A7D37AEA70}"/>
+              </a:ext>
+            </a:extLst>
+          </p:cNvPr>
+          <p:cNvGrpSpPr/>
+          <p:nvPr/>
+        </p:nvGrpSpPr>
+        <p:grpSpPr>
+          <a:xfrm>
+            <a:off x="1022685" y="3208843"/>
+            <a:ext cx="216000" cy="216000"/>
+            <a:chOff x="1002190" y="1572253"/>
+            <a:chExt cx="216000" cy="216000"/>
+          </a:xfrm>
+        </p:grpSpPr>
+        <p:sp>
+          <p:nvSpPr>
+            <p:cNvPr id="9" name="TextBox 8">
+              <a:extLst>
+                <a:ext uri="{FF2B5EF4-FFF2-40B4-BE49-F238E27FC236}">
+                  <a16:creationId xmlns:a16="http://schemas.microsoft.com/office/drawing/2014/main" id="{5EDC42DB-1C47-3585-A8BB-0D6F1A778234}"/>
+                </a:ext>
+              </a:extLst>
+            </p:cNvPr>
+            <p:cNvSpPr txBox="1"/>
+            <p:nvPr/>
+          </p:nvSpPr>
+          <p:spPr>
+            <a:xfrm>
+              <a:off x="1002190" y="1572253"/>
+              <a:ext cx="216000" cy="216000"/>
+            </a:xfrm>
+            <a:prstGeom prst="rect">
+              <a:avLst/>
+            </a:prstGeom>
+            <a:noFill/>
+          </p:spPr>
+          <p:txBody>
+            <a:bodyPr wrap="square" rtlCol="0">
+              <a:spAutoFit/>
+            </a:bodyPr>
+            <a:lstStyle/>
+            <a:p>
+              <a:r>
+                <a:rPr lang="en-US" sz="800" dirty="0">
+                  <a:latin typeface="Calibri" panose="020F0502020204030204" pitchFamily="34" charset="0"/>
+                  <a:cs typeface="Calibri" panose="020F0502020204030204" pitchFamily="34" charset="0"/>
+                </a:rPr>
+                <a:t>c</a:t>
+              </a:r>
+              <a:endParaRPr lang="en-GB" sz="800" dirty="0">
+                <a:latin typeface="Calibri" panose="020F0502020204030204" pitchFamily="34" charset="0"/>
+                <a:cs typeface="Calibri" panose="020F0502020204030204" pitchFamily="34" charset="0"/>
+              </a:endParaRPr>
+            </a:p>
+          </p:txBody>
+        </p:sp>
+        <p:sp>
+          <p:nvSpPr>
+            <p:cNvPr id="10" name="Rectangle 9">
+              <a:extLst>
+                <a:ext uri="{FF2B5EF4-FFF2-40B4-BE49-F238E27FC236}">
+                  <a16:creationId xmlns:a16="http://schemas.microsoft.com/office/drawing/2014/main" id="{0B7209E3-94EF-0867-055D-5CA5BDB0F8CC}"/>
+                </a:ext>
+              </a:extLst>
+            </p:cNvPr>
+            <p:cNvSpPr/>
+            <p:nvPr/>
+          </p:nvSpPr>
+          <p:spPr>
+            <a:xfrm>
+              <a:off x="1040747" y="1619373"/>
+              <a:ext cx="144000" cy="144000"/>
+            </a:xfrm>
+            <a:prstGeom prst="rect">
+              <a:avLst/>
+            </a:prstGeom>
+            <a:noFill/>
+            <a:ln w="3175">
+              <a:solidFill>
+                <a:schemeClr val="tx1">
+                  <a:lumMod val="75000"/>
+                  <a:lumOff val="25000"/>
+                </a:schemeClr>
+              </a:solidFill>
+            </a:ln>
+          </p:spPr>
+          <p:style>
+            <a:lnRef idx="2">
+              <a:schemeClr val="accent1">
+                <a:shade val="15000"/>
+              </a:schemeClr>
+            </a:lnRef>
+            <a:fillRef idx="1">
+              <a:schemeClr val="accent1"/>
+            </a:fillRef>
+            <a:effectRef idx="0">
+              <a:schemeClr val="accent1"/>
+            </a:effectRef>
+            <a:fontRef idx="minor">
+              <a:schemeClr val="lt1"/>
+            </a:fontRef>
+          </p:style>
+          <p:txBody>
+            <a:bodyPr rtlCol="0" anchor="ctr"/>
+            <a:lstStyle/>
+            <a:p>
+              <a:pPr algn="ctr"/>
+              <a:endParaRPr lang="en-GB"/>
+            </a:p>
+          </p:txBody>
+        </p:sp>
+      </p:grpSp>
+      <p:grpSp>
+        <p:nvGrpSpPr>
+          <p:cNvPr id="11" name="Group 10">
+            <a:extLst>
+              <a:ext uri="{FF2B5EF4-FFF2-40B4-BE49-F238E27FC236}">
+                <a16:creationId xmlns:a16="http://schemas.microsoft.com/office/drawing/2014/main" id="{9BC8FB17-F955-CC33-A429-629274941814}"/>
+              </a:ext>
+            </a:extLst>
+          </p:cNvPr>
+          <p:cNvGrpSpPr/>
+          <p:nvPr/>
+        </p:nvGrpSpPr>
+        <p:grpSpPr>
+          <a:xfrm>
+            <a:off x="1022685" y="4185262"/>
+            <a:ext cx="216000" cy="216000"/>
+            <a:chOff x="1002190" y="1572253"/>
+            <a:chExt cx="216000" cy="216000"/>
+          </a:xfrm>
+        </p:grpSpPr>
+        <p:sp>
+          <p:nvSpPr>
+            <p:cNvPr id="12" name="TextBox 11">
+              <a:extLst>
+                <a:ext uri="{FF2B5EF4-FFF2-40B4-BE49-F238E27FC236}">
+                  <a16:creationId xmlns:a16="http://schemas.microsoft.com/office/drawing/2014/main" id="{B919007B-DAAB-9133-CA8F-F8AEDE9EF94C}"/>
+                </a:ext>
+              </a:extLst>
+            </p:cNvPr>
+            <p:cNvSpPr txBox="1"/>
+            <p:nvPr/>
+          </p:nvSpPr>
+          <p:spPr>
+            <a:xfrm>
+              <a:off x="1002190" y="1572253"/>
+              <a:ext cx="216000" cy="216000"/>
+            </a:xfrm>
+            <a:prstGeom prst="rect">
+              <a:avLst/>
+            </a:prstGeom>
+            <a:noFill/>
+          </p:spPr>
+          <p:txBody>
+            <a:bodyPr wrap="square" rtlCol="0">
+              <a:spAutoFit/>
+            </a:bodyPr>
+            <a:lstStyle/>
+            <a:p>
+              <a:r>
+                <a:rPr lang="en-US" sz="800" dirty="0">
+                  <a:latin typeface="Calibri" panose="020F0502020204030204" pitchFamily="34" charset="0"/>
+                  <a:cs typeface="Calibri" panose="020F0502020204030204" pitchFamily="34" charset="0"/>
+                </a:rPr>
+                <a:t>d</a:t>
+              </a:r>
+              <a:endParaRPr lang="en-GB" sz="800" dirty="0">
+                <a:latin typeface="Calibri" panose="020F0502020204030204" pitchFamily="34" charset="0"/>
+                <a:cs typeface="Calibri" panose="020F0502020204030204" pitchFamily="34" charset="0"/>
+              </a:endParaRPr>
+            </a:p>
+          </p:txBody>
+        </p:sp>
+        <p:sp>
+          <p:nvSpPr>
+            <p:cNvPr id="13" name="Rectangle 12">
+              <a:extLst>
+                <a:ext uri="{FF2B5EF4-FFF2-40B4-BE49-F238E27FC236}">
+                  <a16:creationId xmlns:a16="http://schemas.microsoft.com/office/drawing/2014/main" id="{3B7D9A1C-B46C-E4D8-825F-F38504C3FDEE}"/>
+                </a:ext>
+              </a:extLst>
+            </p:cNvPr>
+            <p:cNvSpPr/>
+            <p:nvPr/>
+          </p:nvSpPr>
+          <p:spPr>
+            <a:xfrm>
+              <a:off x="1040747" y="1619373"/>
+              <a:ext cx="144000" cy="144000"/>
+            </a:xfrm>
+            <a:prstGeom prst="rect">
+              <a:avLst/>
+            </a:prstGeom>
+            <a:noFill/>
+            <a:ln w="3175">
+              <a:solidFill>
+                <a:schemeClr val="tx1">
+                  <a:lumMod val="75000"/>
+                  <a:lumOff val="25000"/>
+                </a:schemeClr>
+              </a:solidFill>
+            </a:ln>
+          </p:spPr>
+          <p:style>
+            <a:lnRef idx="2">
+              <a:schemeClr val="accent1">
+                <a:shade val="15000"/>
+              </a:schemeClr>
+            </a:lnRef>
+            <a:fillRef idx="1">
+              <a:schemeClr val="accent1"/>
+            </a:fillRef>
+            <a:effectRef idx="0">
+              <a:schemeClr val="accent1"/>
+            </a:effectRef>
+            <a:fontRef idx="minor">
+              <a:schemeClr val="lt1"/>
+            </a:fontRef>
+          </p:style>
+          <p:txBody>
+            <a:bodyPr rtlCol="0" anchor="ctr"/>
+            <a:lstStyle/>
+            <a:p>
+              <a:pPr algn="ctr"/>
+              <a:endParaRPr lang="en-GB"/>
+            </a:p>
+          </p:txBody>
+        </p:sp>
+      </p:grpSp>
+      <p:grpSp>
+        <p:nvGrpSpPr>
+          <p:cNvPr id="14" name="Group 13">
+            <a:extLst>
+              <a:ext uri="{FF2B5EF4-FFF2-40B4-BE49-F238E27FC236}">
+                <a16:creationId xmlns:a16="http://schemas.microsoft.com/office/drawing/2014/main" id="{6E47BAAF-2795-52F1-75D4-7FE36346F781}"/>
+              </a:ext>
+            </a:extLst>
+          </p:cNvPr>
+          <p:cNvGrpSpPr/>
+          <p:nvPr/>
+        </p:nvGrpSpPr>
+        <p:grpSpPr>
+          <a:xfrm>
+            <a:off x="1022685" y="5161681"/>
+            <a:ext cx="216000" cy="216000"/>
+            <a:chOff x="1002190" y="1572253"/>
+            <a:chExt cx="216000" cy="216000"/>
+          </a:xfrm>
+        </p:grpSpPr>
+        <p:sp>
+          <p:nvSpPr>
+            <p:cNvPr id="15" name="TextBox 14">
+              <a:extLst>
+                <a:ext uri="{FF2B5EF4-FFF2-40B4-BE49-F238E27FC236}">
+                  <a16:creationId xmlns:a16="http://schemas.microsoft.com/office/drawing/2014/main" id="{898CBFFC-51D6-E3A6-B65C-76E9E62A659D}"/>
+                </a:ext>
+              </a:extLst>
+            </p:cNvPr>
+            <p:cNvSpPr txBox="1"/>
+            <p:nvPr/>
+          </p:nvSpPr>
+          <p:spPr>
+            <a:xfrm>
+              <a:off x="1002190" y="1572253"/>
+              <a:ext cx="216000" cy="216000"/>
+            </a:xfrm>
+            <a:prstGeom prst="rect">
+              <a:avLst/>
+            </a:prstGeom>
+            <a:noFill/>
+          </p:spPr>
+          <p:txBody>
+            <a:bodyPr wrap="square" rtlCol="0">
+              <a:spAutoFit/>
+            </a:bodyPr>
+            <a:lstStyle/>
+            <a:p>
+              <a:r>
+                <a:rPr lang="en-US" sz="800" dirty="0">
+                  <a:latin typeface="Calibri" panose="020F0502020204030204" pitchFamily="34" charset="0"/>
+                  <a:cs typeface="Calibri" panose="020F0502020204030204" pitchFamily="34" charset="0"/>
+                </a:rPr>
+                <a:t>e</a:t>
+              </a:r>
+              <a:endParaRPr lang="en-GB" sz="800" dirty="0">
+                <a:latin typeface="Calibri" panose="020F0502020204030204" pitchFamily="34" charset="0"/>
+                <a:cs typeface="Calibri" panose="020F0502020204030204" pitchFamily="34" charset="0"/>
+              </a:endParaRPr>
+            </a:p>
+          </p:txBody>
+        </p:sp>
+        <p:sp>
+          <p:nvSpPr>
+            <p:cNvPr id="16" name="Rectangle 15">
+              <a:extLst>
+                <a:ext uri="{FF2B5EF4-FFF2-40B4-BE49-F238E27FC236}">
+                  <a16:creationId xmlns:a16="http://schemas.microsoft.com/office/drawing/2014/main" id="{4F4FE2DD-2023-94F4-702E-49C62078BF1D}"/>
+                </a:ext>
+              </a:extLst>
+            </p:cNvPr>
+            <p:cNvSpPr/>
+            <p:nvPr/>
+          </p:nvSpPr>
+          <p:spPr>
+            <a:xfrm>
+              <a:off x="1040747" y="1619373"/>
+              <a:ext cx="144000" cy="144000"/>
+            </a:xfrm>
+            <a:prstGeom prst="rect">
+              <a:avLst/>
+            </a:prstGeom>
+            <a:noFill/>
+            <a:ln w="3175">
+              <a:solidFill>
+                <a:schemeClr val="tx1">
+                  <a:lumMod val="75000"/>
+                  <a:lumOff val="25000"/>
+                </a:schemeClr>
+              </a:solidFill>
+            </a:ln>
+          </p:spPr>
+          <p:style>
+            <a:lnRef idx="2">
+              <a:schemeClr val="accent1">
+                <a:shade val="15000"/>
+              </a:schemeClr>
+            </a:lnRef>
+            <a:fillRef idx="1">
+              <a:schemeClr val="accent1"/>
+            </a:fillRef>
+            <a:effectRef idx="0">
+              <a:schemeClr val="accent1"/>
+            </a:effectRef>
+            <a:fontRef idx="minor">
+              <a:schemeClr val="lt1"/>
+            </a:fontRef>
+          </p:style>
+          <p:txBody>
+            <a:bodyPr rtlCol="0" anchor="ctr"/>
+            <a:lstStyle/>
+            <a:p>
+              <a:pPr algn="ctr"/>
+              <a:endParaRPr lang="en-GB"/>
+            </a:p>
+          </p:txBody>
+        </p:sp>
+      </p:grpSp>
+      <p:grpSp>
+        <p:nvGrpSpPr>
+          <p:cNvPr id="17" name="Group 16">
+            <a:extLst>
+              <a:ext uri="{FF2B5EF4-FFF2-40B4-BE49-F238E27FC236}">
+                <a16:creationId xmlns:a16="http://schemas.microsoft.com/office/drawing/2014/main" id="{349B1FF6-A37B-1692-3781-4638D6ED5B93}"/>
+              </a:ext>
+            </a:extLst>
+          </p:cNvPr>
+          <p:cNvGrpSpPr/>
+          <p:nvPr/>
+        </p:nvGrpSpPr>
+        <p:grpSpPr>
+          <a:xfrm>
+            <a:off x="1022685" y="6138102"/>
+            <a:ext cx="216000" cy="216000"/>
+            <a:chOff x="1002190" y="1572253"/>
+            <a:chExt cx="216000" cy="216000"/>
+          </a:xfrm>
+        </p:grpSpPr>
+        <p:sp>
+          <p:nvSpPr>
+            <p:cNvPr id="18" name="TextBox 17">
+              <a:extLst>
+                <a:ext uri="{FF2B5EF4-FFF2-40B4-BE49-F238E27FC236}">
+                  <a16:creationId xmlns:a16="http://schemas.microsoft.com/office/drawing/2014/main" id="{58451BEB-1A5D-0A68-3713-AA01552F4649}"/>
+                </a:ext>
+              </a:extLst>
+            </p:cNvPr>
+            <p:cNvSpPr txBox="1"/>
+            <p:nvPr/>
+          </p:nvSpPr>
+          <p:spPr>
+            <a:xfrm>
+              <a:off x="1002190" y="1572253"/>
+              <a:ext cx="216000" cy="216000"/>
+            </a:xfrm>
+            <a:prstGeom prst="rect">
+              <a:avLst/>
+            </a:prstGeom>
+            <a:noFill/>
+          </p:spPr>
+          <p:txBody>
+            <a:bodyPr wrap="square" rtlCol="0">
+              <a:spAutoFit/>
+            </a:bodyPr>
+            <a:lstStyle/>
+            <a:p>
+              <a:r>
+                <a:rPr lang="en-US" sz="800" dirty="0">
+                  <a:latin typeface="Calibri" panose="020F0502020204030204" pitchFamily="34" charset="0"/>
+                  <a:cs typeface="Calibri" panose="020F0502020204030204" pitchFamily="34" charset="0"/>
+                </a:rPr>
+                <a:t>f</a:t>
+              </a:r>
+              <a:endParaRPr lang="en-GB" sz="800" dirty="0">
+                <a:latin typeface="Calibri" panose="020F0502020204030204" pitchFamily="34" charset="0"/>
+                <a:cs typeface="Calibri" panose="020F0502020204030204" pitchFamily="34" charset="0"/>
+              </a:endParaRPr>
+            </a:p>
+          </p:txBody>
+        </p:sp>
+        <p:sp>
+          <p:nvSpPr>
+            <p:cNvPr id="19" name="Rectangle 18">
+              <a:extLst>
+                <a:ext uri="{FF2B5EF4-FFF2-40B4-BE49-F238E27FC236}">
+                  <a16:creationId xmlns:a16="http://schemas.microsoft.com/office/drawing/2014/main" id="{E18B4FE3-2D0A-CB1A-C022-02785FFF8966}"/>
+                </a:ext>
+              </a:extLst>
+            </p:cNvPr>
+            <p:cNvSpPr/>
+            <p:nvPr/>
+          </p:nvSpPr>
+          <p:spPr>
+            <a:xfrm>
+              <a:off x="1040747" y="1619373"/>
+              <a:ext cx="144000" cy="144000"/>
+            </a:xfrm>
+            <a:prstGeom prst="rect">
+              <a:avLst/>
+            </a:prstGeom>
+            <a:noFill/>
+            <a:ln w="3175">
+              <a:solidFill>
+                <a:schemeClr val="tx1">
+                  <a:lumMod val="75000"/>
+                  <a:lumOff val="25000"/>
+                </a:schemeClr>
+              </a:solidFill>
+            </a:ln>
+          </p:spPr>
+          <p:style>
+            <a:lnRef idx="2">
+              <a:schemeClr val="accent1">
+                <a:shade val="15000"/>
+              </a:schemeClr>
+            </a:lnRef>
+            <a:fillRef idx="1">
+              <a:schemeClr val="accent1"/>
+            </a:fillRef>
+            <a:effectRef idx="0">
+              <a:schemeClr val="accent1"/>
+            </a:effectRef>
+            <a:fontRef idx="minor">
+              <a:schemeClr val="lt1"/>
+            </a:fontRef>
+          </p:style>
+          <p:txBody>
+            <a:bodyPr rtlCol="0" anchor="ctr"/>
+            <a:lstStyle/>
+            <a:p>
+              <a:pPr algn="ctr"/>
+              <a:endParaRPr lang="en-GB"/>
+            </a:p>
+          </p:txBody>
+        </p:sp>
+      </p:grpSp>
+      <p:grpSp>
+        <p:nvGrpSpPr>
+          <p:cNvPr id="20" name="Group 19">
+            <a:extLst>
+              <a:ext uri="{FF2B5EF4-FFF2-40B4-BE49-F238E27FC236}">
+                <a16:creationId xmlns:a16="http://schemas.microsoft.com/office/drawing/2014/main" id="{F78F5CF6-F9F6-5DC4-EC05-5C4D80B9AD25}"/>
+              </a:ext>
+            </a:extLst>
+          </p:cNvPr>
+          <p:cNvGrpSpPr/>
+          <p:nvPr/>
+        </p:nvGrpSpPr>
+        <p:grpSpPr>
+          <a:xfrm>
+            <a:off x="1993135" y="1256005"/>
+            <a:ext cx="216000" cy="216000"/>
+            <a:chOff x="1002190" y="1572253"/>
+            <a:chExt cx="216000" cy="216000"/>
+          </a:xfrm>
+        </p:grpSpPr>
+        <p:sp>
+          <p:nvSpPr>
+            <p:cNvPr id="21" name="TextBox 20">
+              <a:extLst>
+                <a:ext uri="{FF2B5EF4-FFF2-40B4-BE49-F238E27FC236}">
+                  <a16:creationId xmlns:a16="http://schemas.microsoft.com/office/drawing/2014/main" id="{E3E5C760-592D-E744-5BC3-F4EB4F1E1850}"/>
+                </a:ext>
+              </a:extLst>
+            </p:cNvPr>
+            <p:cNvSpPr txBox="1"/>
+            <p:nvPr/>
+          </p:nvSpPr>
+          <p:spPr>
+            <a:xfrm>
+              <a:off x="1002190" y="1572253"/>
+              <a:ext cx="216000" cy="216000"/>
+            </a:xfrm>
+            <a:prstGeom prst="rect">
+              <a:avLst/>
+            </a:prstGeom>
+            <a:noFill/>
+          </p:spPr>
+          <p:txBody>
+            <a:bodyPr wrap="square" rtlCol="0">
+              <a:spAutoFit/>
+            </a:bodyPr>
+            <a:lstStyle/>
+            <a:p>
+              <a:r>
+                <a:rPr lang="en-US" sz="800" dirty="0">
+                  <a:latin typeface="Calibri" panose="020F0502020204030204" pitchFamily="34" charset="0"/>
+                  <a:cs typeface="Calibri" panose="020F0502020204030204" pitchFamily="34" charset="0"/>
+                </a:rPr>
+                <a:t>g</a:t>
+              </a:r>
+              <a:endParaRPr lang="en-GB" sz="800" dirty="0">
+                <a:latin typeface="Calibri" panose="020F0502020204030204" pitchFamily="34" charset="0"/>
+                <a:cs typeface="Calibri" panose="020F0502020204030204" pitchFamily="34" charset="0"/>
+              </a:endParaRPr>
+            </a:p>
+          </p:txBody>
+        </p:sp>
+        <p:sp>
+          <p:nvSpPr>
+            <p:cNvPr id="22" name="Rectangle 21">
+              <a:extLst>
+                <a:ext uri="{FF2B5EF4-FFF2-40B4-BE49-F238E27FC236}">
+                  <a16:creationId xmlns:a16="http://schemas.microsoft.com/office/drawing/2014/main" id="{CDB8B6A4-7952-D738-1515-16FE976B7938}"/>
+                </a:ext>
+              </a:extLst>
+            </p:cNvPr>
+            <p:cNvSpPr/>
+            <p:nvPr/>
+          </p:nvSpPr>
+          <p:spPr>
+            <a:xfrm>
+              <a:off x="1040747" y="1619373"/>
+              <a:ext cx="144000" cy="144000"/>
+            </a:xfrm>
+            <a:prstGeom prst="rect">
+              <a:avLst/>
+            </a:prstGeom>
+            <a:noFill/>
+            <a:ln w="3175">
+              <a:solidFill>
+                <a:schemeClr val="tx1">
+                  <a:lumMod val="75000"/>
+                  <a:lumOff val="25000"/>
+                </a:schemeClr>
+              </a:solidFill>
+            </a:ln>
+          </p:spPr>
+          <p:style>
+            <a:lnRef idx="2">
+              <a:schemeClr val="accent1">
+                <a:shade val="15000"/>
+              </a:schemeClr>
+            </a:lnRef>
+            <a:fillRef idx="1">
+              <a:schemeClr val="accent1"/>
+            </a:fillRef>
+            <a:effectRef idx="0">
+              <a:schemeClr val="accent1"/>
+            </a:effectRef>
+            <a:fontRef idx="minor">
+              <a:schemeClr val="lt1"/>
+            </a:fontRef>
+          </p:style>
+          <p:txBody>
+            <a:bodyPr rtlCol="0" anchor="ctr"/>
+            <a:lstStyle/>
+            <a:p>
+              <a:pPr algn="ctr"/>
+              <a:endParaRPr lang="en-GB"/>
+            </a:p>
+          </p:txBody>
+        </p:sp>
+      </p:grpSp>
+      <p:grpSp>
+        <p:nvGrpSpPr>
+          <p:cNvPr id="23" name="Group 22">
+            <a:extLst>
+              <a:ext uri="{FF2B5EF4-FFF2-40B4-BE49-F238E27FC236}">
+                <a16:creationId xmlns:a16="http://schemas.microsoft.com/office/drawing/2014/main" id="{94C5419E-44A6-D295-901B-C470EB8846ED}"/>
+              </a:ext>
+            </a:extLst>
+          </p:cNvPr>
+          <p:cNvGrpSpPr/>
+          <p:nvPr/>
+        </p:nvGrpSpPr>
+        <p:grpSpPr>
+          <a:xfrm>
+            <a:off x="1993135" y="2232424"/>
+            <a:ext cx="216000" cy="216000"/>
+            <a:chOff x="1002190" y="1572253"/>
+            <a:chExt cx="216000" cy="216000"/>
+          </a:xfrm>
+        </p:grpSpPr>
+        <p:sp>
+          <p:nvSpPr>
+            <p:cNvPr id="24" name="TextBox 23">
+              <a:extLst>
+                <a:ext uri="{FF2B5EF4-FFF2-40B4-BE49-F238E27FC236}">
+                  <a16:creationId xmlns:a16="http://schemas.microsoft.com/office/drawing/2014/main" id="{13A9E51D-DCEF-940C-7CD1-9AC6311F7C58}"/>
+                </a:ext>
+              </a:extLst>
+            </p:cNvPr>
+            <p:cNvSpPr txBox="1"/>
+            <p:nvPr/>
+          </p:nvSpPr>
+          <p:spPr>
+            <a:xfrm>
+              <a:off x="1002190" y="1572253"/>
+              <a:ext cx="216000" cy="216000"/>
+            </a:xfrm>
+            <a:prstGeom prst="rect">
+              <a:avLst/>
+            </a:prstGeom>
+            <a:noFill/>
+          </p:spPr>
+          <p:txBody>
+            <a:bodyPr wrap="square" rtlCol="0">
+              <a:spAutoFit/>
+            </a:bodyPr>
+            <a:lstStyle/>
+            <a:p>
+              <a:r>
+                <a:rPr lang="en-US" sz="800" dirty="0">
+                  <a:latin typeface="Calibri" panose="020F0502020204030204" pitchFamily="34" charset="0"/>
+                  <a:cs typeface="Calibri" panose="020F0502020204030204" pitchFamily="34" charset="0"/>
+                </a:rPr>
+                <a:t>h</a:t>
+              </a:r>
+              <a:endParaRPr lang="en-GB" sz="800" dirty="0">
+                <a:latin typeface="Calibri" panose="020F0502020204030204" pitchFamily="34" charset="0"/>
+                <a:cs typeface="Calibri" panose="020F0502020204030204" pitchFamily="34" charset="0"/>
+              </a:endParaRPr>
+            </a:p>
+          </p:txBody>
+        </p:sp>
+        <p:sp>
+          <p:nvSpPr>
+            <p:cNvPr id="25" name="Rectangle 24">
+              <a:extLst>
+                <a:ext uri="{FF2B5EF4-FFF2-40B4-BE49-F238E27FC236}">
+                  <a16:creationId xmlns:a16="http://schemas.microsoft.com/office/drawing/2014/main" id="{54F743EC-5032-BC9D-5F31-205A9040DAC3}"/>
+                </a:ext>
+              </a:extLst>
+            </p:cNvPr>
+            <p:cNvSpPr/>
+            <p:nvPr/>
+          </p:nvSpPr>
+          <p:spPr>
+            <a:xfrm>
+              <a:off x="1040747" y="1619373"/>
+              <a:ext cx="144000" cy="144000"/>
+            </a:xfrm>
+            <a:prstGeom prst="rect">
+              <a:avLst/>
+            </a:prstGeom>
+            <a:noFill/>
+            <a:ln w="3175">
+              <a:solidFill>
+                <a:schemeClr val="tx1">
+                  <a:lumMod val="75000"/>
+                  <a:lumOff val="25000"/>
+                </a:schemeClr>
+              </a:solidFill>
+            </a:ln>
+          </p:spPr>
+          <p:style>
+            <a:lnRef idx="2">
+              <a:schemeClr val="accent1">
+                <a:shade val="15000"/>
+              </a:schemeClr>
+            </a:lnRef>
+            <a:fillRef idx="1">
+              <a:schemeClr val="accent1"/>
+            </a:fillRef>
+            <a:effectRef idx="0">
+              <a:schemeClr val="accent1"/>
+            </a:effectRef>
+            <a:fontRef idx="minor">
+              <a:schemeClr val="lt1"/>
+            </a:fontRef>
+          </p:style>
+          <p:txBody>
+            <a:bodyPr rtlCol="0" anchor="ctr"/>
+            <a:lstStyle/>
+            <a:p>
+              <a:pPr algn="ctr"/>
+              <a:endParaRPr lang="en-GB"/>
+            </a:p>
+          </p:txBody>
+        </p:sp>
+      </p:grpSp>
+      <p:grpSp>
+        <p:nvGrpSpPr>
+          <p:cNvPr id="26" name="Group 25">
+            <a:extLst>
+              <a:ext uri="{FF2B5EF4-FFF2-40B4-BE49-F238E27FC236}">
+                <a16:creationId xmlns:a16="http://schemas.microsoft.com/office/drawing/2014/main" id="{CC198BBF-9E34-46AB-56CC-DBB007491D17}"/>
+              </a:ext>
+            </a:extLst>
+          </p:cNvPr>
+          <p:cNvGrpSpPr/>
+          <p:nvPr/>
+        </p:nvGrpSpPr>
+        <p:grpSpPr>
+          <a:xfrm>
+            <a:off x="1993135" y="3208843"/>
+            <a:ext cx="216000" cy="216000"/>
+            <a:chOff x="1002190" y="1572253"/>
+            <a:chExt cx="216000" cy="216000"/>
+          </a:xfrm>
+        </p:grpSpPr>
+        <p:sp>
+          <p:nvSpPr>
+            <p:cNvPr id="27" name="TextBox 26">
+              <a:extLst>
+                <a:ext uri="{FF2B5EF4-FFF2-40B4-BE49-F238E27FC236}">
+                  <a16:creationId xmlns:a16="http://schemas.microsoft.com/office/drawing/2014/main" id="{130E7E0B-852B-FCF8-F9A5-F7B5D7C18BFF}"/>
+                </a:ext>
+              </a:extLst>
+            </p:cNvPr>
+            <p:cNvSpPr txBox="1"/>
+            <p:nvPr/>
+          </p:nvSpPr>
+          <p:spPr>
+            <a:xfrm>
+              <a:off x="1002190" y="1572253"/>
+              <a:ext cx="216000" cy="216000"/>
+            </a:xfrm>
+            <a:prstGeom prst="rect">
+              <a:avLst/>
+            </a:prstGeom>
+            <a:noFill/>
+          </p:spPr>
+          <p:txBody>
+            <a:bodyPr wrap="square" rtlCol="0">
+              <a:spAutoFit/>
+            </a:bodyPr>
+            <a:lstStyle/>
+            <a:p>
+              <a:r>
+                <a:rPr lang="en-US" sz="800" dirty="0">
+                  <a:latin typeface="Calibri" panose="020F0502020204030204" pitchFamily="34" charset="0"/>
+                  <a:cs typeface="Calibri" panose="020F0502020204030204" pitchFamily="34" charset="0"/>
+                </a:rPr>
+                <a:t>i</a:t>
+              </a:r>
+              <a:endParaRPr lang="en-GB" sz="800" dirty="0">
+                <a:latin typeface="Calibri" panose="020F0502020204030204" pitchFamily="34" charset="0"/>
+                <a:cs typeface="Calibri" panose="020F0502020204030204" pitchFamily="34" charset="0"/>
+              </a:endParaRPr>
+            </a:p>
+          </p:txBody>
+        </p:sp>
+        <p:sp>
+          <p:nvSpPr>
+            <p:cNvPr id="41" name="Rectangle 40">
+              <a:extLst>
+                <a:ext uri="{FF2B5EF4-FFF2-40B4-BE49-F238E27FC236}">
+                  <a16:creationId xmlns:a16="http://schemas.microsoft.com/office/drawing/2014/main" id="{9EDB0BE9-975B-CD20-E6D6-2BEE52FF1B5D}"/>
+                </a:ext>
+              </a:extLst>
+            </p:cNvPr>
+            <p:cNvSpPr/>
+            <p:nvPr/>
+          </p:nvSpPr>
+          <p:spPr>
+            <a:xfrm>
+              <a:off x="1040747" y="1619373"/>
+              <a:ext cx="144000" cy="144000"/>
+            </a:xfrm>
+            <a:prstGeom prst="rect">
+              <a:avLst/>
+            </a:prstGeom>
+            <a:noFill/>
+            <a:ln w="3175">
+              <a:solidFill>
+                <a:schemeClr val="tx1">
+                  <a:lumMod val="75000"/>
+                  <a:lumOff val="25000"/>
+                </a:schemeClr>
+              </a:solidFill>
+            </a:ln>
+          </p:spPr>
+          <p:style>
+            <a:lnRef idx="2">
+              <a:schemeClr val="accent1">
+                <a:shade val="15000"/>
+              </a:schemeClr>
+            </a:lnRef>
+            <a:fillRef idx="1">
+              <a:schemeClr val="accent1"/>
+            </a:fillRef>
+            <a:effectRef idx="0">
+              <a:schemeClr val="accent1"/>
+            </a:effectRef>
+            <a:fontRef idx="minor">
+              <a:schemeClr val="lt1"/>
+            </a:fontRef>
+          </p:style>
+          <p:txBody>
+            <a:bodyPr rtlCol="0" anchor="ctr"/>
+            <a:lstStyle/>
+            <a:p>
+              <a:pPr algn="ctr"/>
+              <a:endParaRPr lang="en-GB"/>
+            </a:p>
+          </p:txBody>
+        </p:sp>
+      </p:grpSp>
+      <p:grpSp>
+        <p:nvGrpSpPr>
+          <p:cNvPr id="42" name="Group 41">
+            <a:extLst>
+              <a:ext uri="{FF2B5EF4-FFF2-40B4-BE49-F238E27FC236}">
+                <a16:creationId xmlns:a16="http://schemas.microsoft.com/office/drawing/2014/main" id="{52630040-975D-FC19-467F-63E7A1126C52}"/>
+              </a:ext>
+            </a:extLst>
+          </p:cNvPr>
+          <p:cNvGrpSpPr/>
+          <p:nvPr/>
+        </p:nvGrpSpPr>
+        <p:grpSpPr>
+          <a:xfrm>
+            <a:off x="1993135" y="4185262"/>
+            <a:ext cx="216000" cy="216000"/>
+            <a:chOff x="1002190" y="1572253"/>
+            <a:chExt cx="216000" cy="216000"/>
+          </a:xfrm>
+        </p:grpSpPr>
+        <p:sp>
+          <p:nvSpPr>
+            <p:cNvPr id="43" name="TextBox 42">
+              <a:extLst>
+                <a:ext uri="{FF2B5EF4-FFF2-40B4-BE49-F238E27FC236}">
+                  <a16:creationId xmlns:a16="http://schemas.microsoft.com/office/drawing/2014/main" id="{37598A7D-FF95-9518-97E1-D840660A93C0}"/>
+                </a:ext>
+              </a:extLst>
+            </p:cNvPr>
+            <p:cNvSpPr txBox="1"/>
+            <p:nvPr/>
+          </p:nvSpPr>
+          <p:spPr>
+            <a:xfrm>
+              <a:off x="1002190" y="1572253"/>
+              <a:ext cx="216000" cy="216000"/>
+            </a:xfrm>
+            <a:prstGeom prst="rect">
+              <a:avLst/>
+            </a:prstGeom>
+            <a:noFill/>
+          </p:spPr>
+          <p:txBody>
+            <a:bodyPr wrap="square" rtlCol="0">
+              <a:spAutoFit/>
+            </a:bodyPr>
+            <a:lstStyle/>
+            <a:p>
+              <a:r>
+                <a:rPr lang="en-US" sz="800" dirty="0">
+                  <a:latin typeface="Calibri" panose="020F0502020204030204" pitchFamily="34" charset="0"/>
+                  <a:cs typeface="Calibri" panose="020F0502020204030204" pitchFamily="34" charset="0"/>
+                </a:rPr>
+                <a:t>j</a:t>
+              </a:r>
+              <a:endParaRPr lang="en-GB" sz="800" dirty="0">
+                <a:latin typeface="Calibri" panose="020F0502020204030204" pitchFamily="34" charset="0"/>
+                <a:cs typeface="Calibri" panose="020F0502020204030204" pitchFamily="34" charset="0"/>
+              </a:endParaRPr>
+            </a:p>
+          </p:txBody>
+        </p:sp>
+        <p:sp>
+          <p:nvSpPr>
+            <p:cNvPr id="44" name="Rectangle 43">
+              <a:extLst>
+                <a:ext uri="{FF2B5EF4-FFF2-40B4-BE49-F238E27FC236}">
+                  <a16:creationId xmlns:a16="http://schemas.microsoft.com/office/drawing/2014/main" id="{1880E6BA-F2FB-BDE3-4E9D-BAA5B296EDF0}"/>
+                </a:ext>
+              </a:extLst>
+            </p:cNvPr>
+            <p:cNvSpPr/>
+            <p:nvPr/>
+          </p:nvSpPr>
+          <p:spPr>
+            <a:xfrm>
+              <a:off x="1040747" y="1619373"/>
+              <a:ext cx="144000" cy="144000"/>
+            </a:xfrm>
+            <a:prstGeom prst="rect">
+              <a:avLst/>
+            </a:prstGeom>
+            <a:noFill/>
+            <a:ln w="3175">
+              <a:solidFill>
+                <a:schemeClr val="tx1">
+                  <a:lumMod val="75000"/>
+                  <a:lumOff val="25000"/>
+                </a:schemeClr>
+              </a:solidFill>
+            </a:ln>
+          </p:spPr>
+          <p:style>
+            <a:lnRef idx="2">
+              <a:schemeClr val="accent1">
+                <a:shade val="15000"/>
+              </a:schemeClr>
+            </a:lnRef>
+            <a:fillRef idx="1">
+              <a:schemeClr val="accent1"/>
+            </a:fillRef>
+            <a:effectRef idx="0">
+              <a:schemeClr val="accent1"/>
+            </a:effectRef>
+            <a:fontRef idx="minor">
+              <a:schemeClr val="lt1"/>
+            </a:fontRef>
+          </p:style>
+          <p:txBody>
+            <a:bodyPr rtlCol="0" anchor="ctr"/>
+            <a:lstStyle/>
+            <a:p>
+              <a:pPr algn="ctr"/>
+              <a:endParaRPr lang="en-GB"/>
+            </a:p>
+          </p:txBody>
+        </p:sp>
+      </p:grpSp>
+      <p:grpSp>
+        <p:nvGrpSpPr>
+          <p:cNvPr id="45" name="Group 44">
+            <a:extLst>
+              <a:ext uri="{FF2B5EF4-FFF2-40B4-BE49-F238E27FC236}">
+                <a16:creationId xmlns:a16="http://schemas.microsoft.com/office/drawing/2014/main" id="{C4C37508-735C-D058-6A46-489E980C434A}"/>
+              </a:ext>
+            </a:extLst>
+          </p:cNvPr>
+          <p:cNvGrpSpPr/>
+          <p:nvPr/>
+        </p:nvGrpSpPr>
+        <p:grpSpPr>
+          <a:xfrm>
+            <a:off x="1993135" y="5161681"/>
+            <a:ext cx="216000" cy="216000"/>
+            <a:chOff x="1002190" y="1572253"/>
+            <a:chExt cx="216000" cy="216000"/>
+          </a:xfrm>
+        </p:grpSpPr>
+        <p:sp>
+          <p:nvSpPr>
+            <p:cNvPr id="46" name="TextBox 45">
+              <a:extLst>
+                <a:ext uri="{FF2B5EF4-FFF2-40B4-BE49-F238E27FC236}">
+                  <a16:creationId xmlns:a16="http://schemas.microsoft.com/office/drawing/2014/main" id="{770EB013-7DEC-8A61-4A3D-9217817B7DB4}"/>
+                </a:ext>
+              </a:extLst>
+            </p:cNvPr>
+            <p:cNvSpPr txBox="1"/>
+            <p:nvPr/>
+          </p:nvSpPr>
+          <p:spPr>
+            <a:xfrm>
+              <a:off x="1002190" y="1572253"/>
+              <a:ext cx="216000" cy="216000"/>
+            </a:xfrm>
+            <a:prstGeom prst="rect">
+              <a:avLst/>
+            </a:prstGeom>
+            <a:noFill/>
+          </p:spPr>
+          <p:txBody>
+            <a:bodyPr wrap="square" rtlCol="0">
+              <a:spAutoFit/>
+            </a:bodyPr>
+            <a:lstStyle/>
+            <a:p>
+              <a:r>
+                <a:rPr lang="en-US" sz="800" dirty="0">
+                  <a:latin typeface="Calibri" panose="020F0502020204030204" pitchFamily="34" charset="0"/>
+                  <a:cs typeface="Calibri" panose="020F0502020204030204" pitchFamily="34" charset="0"/>
+                </a:rPr>
+                <a:t>k</a:t>
+              </a:r>
+              <a:endParaRPr lang="en-GB" sz="800" dirty="0">
+                <a:latin typeface="Calibri" panose="020F0502020204030204" pitchFamily="34" charset="0"/>
+                <a:cs typeface="Calibri" panose="020F0502020204030204" pitchFamily="34" charset="0"/>
+              </a:endParaRPr>
+            </a:p>
+          </p:txBody>
+        </p:sp>
+        <p:sp>
+          <p:nvSpPr>
+            <p:cNvPr id="47" name="Rectangle 46">
+              <a:extLst>
+                <a:ext uri="{FF2B5EF4-FFF2-40B4-BE49-F238E27FC236}">
+                  <a16:creationId xmlns:a16="http://schemas.microsoft.com/office/drawing/2014/main" id="{9770D3A4-7202-5E21-0D8E-E313440CBA9C}"/>
+                </a:ext>
+              </a:extLst>
+            </p:cNvPr>
+            <p:cNvSpPr/>
+            <p:nvPr/>
+          </p:nvSpPr>
+          <p:spPr>
+            <a:xfrm>
+              <a:off x="1040747" y="1619373"/>
+              <a:ext cx="144000" cy="144000"/>
+            </a:xfrm>
+            <a:prstGeom prst="rect">
+              <a:avLst/>
+            </a:prstGeom>
+            <a:noFill/>
+            <a:ln w="3175">
+              <a:solidFill>
+                <a:schemeClr val="tx1">
+                  <a:lumMod val="75000"/>
+                  <a:lumOff val="25000"/>
+                </a:schemeClr>
+              </a:solidFill>
+            </a:ln>
+          </p:spPr>
+          <p:style>
+            <a:lnRef idx="2">
+              <a:schemeClr val="accent1">
+                <a:shade val="15000"/>
+              </a:schemeClr>
+            </a:lnRef>
+            <a:fillRef idx="1">
+              <a:schemeClr val="accent1"/>
+            </a:fillRef>
+            <a:effectRef idx="0">
+              <a:schemeClr val="accent1"/>
+            </a:effectRef>
+            <a:fontRef idx="minor">
+              <a:schemeClr val="lt1"/>
+            </a:fontRef>
+          </p:style>
+          <p:txBody>
+            <a:bodyPr rtlCol="0" anchor="ctr"/>
+            <a:lstStyle/>
+            <a:p>
+              <a:pPr algn="ctr"/>
+              <a:endParaRPr lang="en-GB"/>
+            </a:p>
+          </p:txBody>
+        </p:sp>
+      </p:grpSp>
+      <p:grpSp>
+        <p:nvGrpSpPr>
+          <p:cNvPr id="48" name="Group 47">
+            <a:extLst>
+              <a:ext uri="{FF2B5EF4-FFF2-40B4-BE49-F238E27FC236}">
+                <a16:creationId xmlns:a16="http://schemas.microsoft.com/office/drawing/2014/main" id="{653A994E-AE79-3353-8749-39F903538B98}"/>
+              </a:ext>
+            </a:extLst>
+          </p:cNvPr>
+          <p:cNvGrpSpPr/>
+          <p:nvPr/>
+        </p:nvGrpSpPr>
+        <p:grpSpPr>
+          <a:xfrm>
+            <a:off x="1993135" y="6138102"/>
+            <a:ext cx="216000" cy="216000"/>
+            <a:chOff x="1002190" y="1572253"/>
+            <a:chExt cx="216000" cy="216000"/>
+          </a:xfrm>
+        </p:grpSpPr>
+        <p:sp>
+          <p:nvSpPr>
+            <p:cNvPr id="49" name="TextBox 48">
+              <a:extLst>
+                <a:ext uri="{FF2B5EF4-FFF2-40B4-BE49-F238E27FC236}">
+                  <a16:creationId xmlns:a16="http://schemas.microsoft.com/office/drawing/2014/main" id="{2F31622C-0496-386C-FD35-E3FB0E0DD93A}"/>
+                </a:ext>
+              </a:extLst>
+            </p:cNvPr>
+            <p:cNvSpPr txBox="1"/>
+            <p:nvPr/>
+          </p:nvSpPr>
+          <p:spPr>
+            <a:xfrm>
+              <a:off x="1002190" y="1572253"/>
+              <a:ext cx="216000" cy="216000"/>
+            </a:xfrm>
+            <a:prstGeom prst="rect">
+              <a:avLst/>
+            </a:prstGeom>
+            <a:noFill/>
+          </p:spPr>
+          <p:txBody>
+            <a:bodyPr wrap="square" rtlCol="0">
+              <a:spAutoFit/>
+            </a:bodyPr>
+            <a:lstStyle/>
+            <a:p>
+              <a:r>
+                <a:rPr lang="en-US" sz="800" dirty="0">
+                  <a:latin typeface="Calibri" panose="020F0502020204030204" pitchFamily="34" charset="0"/>
+                  <a:cs typeface="Calibri" panose="020F0502020204030204" pitchFamily="34" charset="0"/>
+                </a:rPr>
+                <a:t>l</a:t>
+              </a:r>
+              <a:endParaRPr lang="en-GB" sz="800" dirty="0">
+                <a:latin typeface="Calibri" panose="020F0502020204030204" pitchFamily="34" charset="0"/>
+                <a:cs typeface="Calibri" panose="020F0502020204030204" pitchFamily="34" charset="0"/>
+              </a:endParaRPr>
+            </a:p>
+          </p:txBody>
+        </p:sp>
+        <p:sp>
+          <p:nvSpPr>
+            <p:cNvPr id="50" name="Rectangle 49">
+              <a:extLst>
+                <a:ext uri="{FF2B5EF4-FFF2-40B4-BE49-F238E27FC236}">
+                  <a16:creationId xmlns:a16="http://schemas.microsoft.com/office/drawing/2014/main" id="{69069D20-D07C-9037-AB7A-E478F7A51932}"/>
+                </a:ext>
+              </a:extLst>
+            </p:cNvPr>
+            <p:cNvSpPr/>
+            <p:nvPr/>
+          </p:nvSpPr>
+          <p:spPr>
+            <a:xfrm>
+              <a:off x="1040747" y="1619373"/>
+              <a:ext cx="144000" cy="144000"/>
+            </a:xfrm>
+            <a:prstGeom prst="rect">
+              <a:avLst/>
+            </a:prstGeom>
+            <a:noFill/>
+            <a:ln w="3175">
+              <a:solidFill>
+                <a:schemeClr val="tx1">
+                  <a:lumMod val="75000"/>
+                  <a:lumOff val="25000"/>
+                </a:schemeClr>
+              </a:solidFill>
+            </a:ln>
+          </p:spPr>
+          <p:style>
+            <a:lnRef idx="2">
+              <a:schemeClr val="accent1">
+                <a:shade val="15000"/>
+              </a:schemeClr>
+            </a:lnRef>
+            <a:fillRef idx="1">
+              <a:schemeClr val="accent1"/>
+            </a:fillRef>
+            <a:effectRef idx="0">
+              <a:schemeClr val="accent1"/>
+            </a:effectRef>
+            <a:fontRef idx="minor">
+              <a:schemeClr val="lt1"/>
+            </a:fontRef>
+          </p:style>
+          <p:txBody>
+            <a:bodyPr rtlCol="0" anchor="ctr"/>
+            <a:lstStyle/>
+            <a:p>
+              <a:pPr algn="ctr"/>
+              <a:endParaRPr lang="en-GB"/>
+            </a:p>
+          </p:txBody>
+        </p:sp>
+      </p:grpSp>
+      <p:grpSp>
+        <p:nvGrpSpPr>
+          <p:cNvPr id="51" name="Group 50">
+            <a:extLst>
+              <a:ext uri="{FF2B5EF4-FFF2-40B4-BE49-F238E27FC236}">
+                <a16:creationId xmlns:a16="http://schemas.microsoft.com/office/drawing/2014/main" id="{CD588A81-05D0-CCF8-7567-448AE67659DE}"/>
+              </a:ext>
+            </a:extLst>
+          </p:cNvPr>
+          <p:cNvGrpSpPr/>
+          <p:nvPr/>
+        </p:nvGrpSpPr>
+        <p:grpSpPr>
+          <a:xfrm>
+            <a:off x="3073361" y="1856362"/>
+            <a:ext cx="216000" cy="216000"/>
+            <a:chOff x="1002190" y="1572253"/>
+            <a:chExt cx="216000" cy="216000"/>
+          </a:xfrm>
+        </p:grpSpPr>
+        <p:sp>
+          <p:nvSpPr>
+            <p:cNvPr id="52" name="TextBox 51">
+              <a:extLst>
+                <a:ext uri="{FF2B5EF4-FFF2-40B4-BE49-F238E27FC236}">
+                  <a16:creationId xmlns:a16="http://schemas.microsoft.com/office/drawing/2014/main" id="{9E22D21B-A82B-503E-95E9-AA62AB077F22}"/>
+                </a:ext>
+              </a:extLst>
+            </p:cNvPr>
+            <p:cNvSpPr txBox="1"/>
+            <p:nvPr/>
+          </p:nvSpPr>
+          <p:spPr>
+            <a:xfrm>
+              <a:off x="1002190" y="1572253"/>
+              <a:ext cx="216000" cy="216000"/>
+            </a:xfrm>
+            <a:prstGeom prst="rect">
+              <a:avLst/>
+            </a:prstGeom>
+            <a:noFill/>
+          </p:spPr>
+          <p:txBody>
+            <a:bodyPr wrap="square" rtlCol="0">
+              <a:spAutoFit/>
+            </a:bodyPr>
+            <a:lstStyle/>
+            <a:p>
+              <a:r>
+                <a:rPr lang="en-US" sz="800" dirty="0">
+                  <a:latin typeface="Calibri" panose="020F0502020204030204" pitchFamily="34" charset="0"/>
+                  <a:cs typeface="Calibri" panose="020F0502020204030204" pitchFamily="34" charset="0"/>
+                </a:rPr>
+                <a:t>m</a:t>
+              </a:r>
+              <a:endParaRPr lang="en-GB" sz="800" dirty="0">
+                <a:latin typeface="Calibri" panose="020F0502020204030204" pitchFamily="34" charset="0"/>
+                <a:cs typeface="Calibri" panose="020F0502020204030204" pitchFamily="34" charset="0"/>
+              </a:endParaRPr>
+            </a:p>
+          </p:txBody>
+        </p:sp>
+        <p:sp>
+          <p:nvSpPr>
+            <p:cNvPr id="53" name="Rectangle 52">
+              <a:extLst>
+                <a:ext uri="{FF2B5EF4-FFF2-40B4-BE49-F238E27FC236}">
+                  <a16:creationId xmlns:a16="http://schemas.microsoft.com/office/drawing/2014/main" id="{26DD2596-F641-D3F2-8C13-F61691CAF3CD}"/>
+                </a:ext>
+              </a:extLst>
+            </p:cNvPr>
+            <p:cNvSpPr/>
+            <p:nvPr/>
+          </p:nvSpPr>
+          <p:spPr>
+            <a:xfrm>
+              <a:off x="1040747" y="1619373"/>
+              <a:ext cx="144000" cy="144000"/>
+            </a:xfrm>
+            <a:prstGeom prst="rect">
+              <a:avLst/>
+            </a:prstGeom>
+            <a:noFill/>
+            <a:ln w="3175">
+              <a:solidFill>
+                <a:schemeClr val="tx1">
+                  <a:lumMod val="75000"/>
+                  <a:lumOff val="25000"/>
+                </a:schemeClr>
+              </a:solidFill>
+            </a:ln>
+          </p:spPr>
+          <p:style>
+            <a:lnRef idx="2">
+              <a:schemeClr val="accent1">
+                <a:shade val="15000"/>
+              </a:schemeClr>
+            </a:lnRef>
+            <a:fillRef idx="1">
+              <a:schemeClr val="accent1"/>
+            </a:fillRef>
+            <a:effectRef idx="0">
+              <a:schemeClr val="accent1"/>
+            </a:effectRef>
+            <a:fontRef idx="minor">
+              <a:schemeClr val="lt1"/>
+            </a:fontRef>
+          </p:style>
+          <p:txBody>
+            <a:bodyPr rtlCol="0" anchor="ctr"/>
+            <a:lstStyle/>
+            <a:p>
+              <a:pPr algn="ctr"/>
+              <a:endParaRPr lang="en-GB"/>
+            </a:p>
+          </p:txBody>
+        </p:sp>
+      </p:grpSp>
+      <p:grpSp>
+        <p:nvGrpSpPr>
+          <p:cNvPr id="54" name="Group 53">
+            <a:extLst>
+              <a:ext uri="{FF2B5EF4-FFF2-40B4-BE49-F238E27FC236}">
+                <a16:creationId xmlns:a16="http://schemas.microsoft.com/office/drawing/2014/main" id="{D3956476-047C-5356-E441-988316C1C0D9}"/>
+              </a:ext>
+            </a:extLst>
+          </p:cNvPr>
+          <p:cNvGrpSpPr/>
+          <p:nvPr/>
+        </p:nvGrpSpPr>
+        <p:grpSpPr>
+          <a:xfrm>
+            <a:off x="3073361" y="2832781"/>
+            <a:ext cx="216000" cy="216000"/>
+            <a:chOff x="1002190" y="1572253"/>
+            <a:chExt cx="216000" cy="216000"/>
+          </a:xfrm>
+        </p:grpSpPr>
+        <p:sp>
+          <p:nvSpPr>
+            <p:cNvPr id="55" name="TextBox 54">
+              <a:extLst>
+                <a:ext uri="{FF2B5EF4-FFF2-40B4-BE49-F238E27FC236}">
+                  <a16:creationId xmlns:a16="http://schemas.microsoft.com/office/drawing/2014/main" id="{65362A44-7A6F-B9C9-7997-8D0A2F374EBE}"/>
+                </a:ext>
+              </a:extLst>
+            </p:cNvPr>
+            <p:cNvSpPr txBox="1"/>
+            <p:nvPr/>
+          </p:nvSpPr>
+          <p:spPr>
+            <a:xfrm>
+              <a:off x="1002190" y="1572253"/>
+              <a:ext cx="216000" cy="216000"/>
+            </a:xfrm>
+            <a:prstGeom prst="rect">
+              <a:avLst/>
+            </a:prstGeom>
+            <a:noFill/>
+          </p:spPr>
+          <p:txBody>
+            <a:bodyPr wrap="square" rtlCol="0">
+              <a:spAutoFit/>
+            </a:bodyPr>
+            <a:lstStyle/>
+            <a:p>
+              <a:r>
+                <a:rPr lang="en-US" sz="800" dirty="0">
+                  <a:latin typeface="Calibri" panose="020F0502020204030204" pitchFamily="34" charset="0"/>
+                  <a:cs typeface="Calibri" panose="020F0502020204030204" pitchFamily="34" charset="0"/>
+                </a:rPr>
+                <a:t>n</a:t>
+              </a:r>
+              <a:endParaRPr lang="en-GB" sz="800" dirty="0">
+                <a:latin typeface="Calibri" panose="020F0502020204030204" pitchFamily="34" charset="0"/>
+                <a:cs typeface="Calibri" panose="020F0502020204030204" pitchFamily="34" charset="0"/>
+              </a:endParaRPr>
+            </a:p>
+          </p:txBody>
+        </p:sp>
+        <p:sp>
+          <p:nvSpPr>
+            <p:cNvPr id="56" name="Rectangle 55">
+              <a:extLst>
+                <a:ext uri="{FF2B5EF4-FFF2-40B4-BE49-F238E27FC236}">
+                  <a16:creationId xmlns:a16="http://schemas.microsoft.com/office/drawing/2014/main" id="{FDC0AD3D-1A84-4D12-2350-298FA48D8F7A}"/>
+                </a:ext>
+              </a:extLst>
+            </p:cNvPr>
+            <p:cNvSpPr/>
+            <p:nvPr/>
+          </p:nvSpPr>
+          <p:spPr>
+            <a:xfrm>
+              <a:off x="1040747" y="1619373"/>
+              <a:ext cx="144000" cy="144000"/>
+            </a:xfrm>
+            <a:prstGeom prst="rect">
+              <a:avLst/>
+            </a:prstGeom>
+            <a:noFill/>
+            <a:ln w="3175">
+              <a:solidFill>
+                <a:schemeClr val="tx1">
+                  <a:lumMod val="75000"/>
+                  <a:lumOff val="25000"/>
+                </a:schemeClr>
+              </a:solidFill>
+            </a:ln>
+          </p:spPr>
+          <p:style>
+            <a:lnRef idx="2">
+              <a:schemeClr val="accent1">
+                <a:shade val="15000"/>
+              </a:schemeClr>
+            </a:lnRef>
+            <a:fillRef idx="1">
+              <a:schemeClr val="accent1"/>
+            </a:fillRef>
+            <a:effectRef idx="0">
+              <a:schemeClr val="accent1"/>
+            </a:effectRef>
+            <a:fontRef idx="minor">
+              <a:schemeClr val="lt1"/>
+            </a:fontRef>
+          </p:style>
+          <p:txBody>
+            <a:bodyPr rtlCol="0" anchor="ctr"/>
+            <a:lstStyle/>
+            <a:p>
+              <a:pPr algn="ctr"/>
+              <a:endParaRPr lang="en-GB"/>
+            </a:p>
+          </p:txBody>
+        </p:sp>
+      </p:grpSp>
+      <p:grpSp>
+        <p:nvGrpSpPr>
+          <p:cNvPr id="57" name="Group 56">
+            <a:extLst>
+              <a:ext uri="{FF2B5EF4-FFF2-40B4-BE49-F238E27FC236}">
+                <a16:creationId xmlns:a16="http://schemas.microsoft.com/office/drawing/2014/main" id="{6F892770-CE53-DD78-D5BB-03ECF901DC01}"/>
+              </a:ext>
+            </a:extLst>
+          </p:cNvPr>
+          <p:cNvGrpSpPr/>
+          <p:nvPr/>
+        </p:nvGrpSpPr>
+        <p:grpSpPr>
+          <a:xfrm>
+            <a:off x="3073361" y="3809200"/>
+            <a:ext cx="216000" cy="216000"/>
+            <a:chOff x="1002190" y="1572253"/>
+            <a:chExt cx="216000" cy="216000"/>
+          </a:xfrm>
+        </p:grpSpPr>
+        <p:sp>
+          <p:nvSpPr>
+            <p:cNvPr id="58" name="TextBox 57">
+              <a:extLst>
+                <a:ext uri="{FF2B5EF4-FFF2-40B4-BE49-F238E27FC236}">
+                  <a16:creationId xmlns:a16="http://schemas.microsoft.com/office/drawing/2014/main" id="{FACC27C7-6D12-1013-ABBA-C896CA506250}"/>
+                </a:ext>
+              </a:extLst>
+            </p:cNvPr>
+            <p:cNvSpPr txBox="1"/>
+            <p:nvPr/>
+          </p:nvSpPr>
+          <p:spPr>
+            <a:xfrm>
+              <a:off x="1002190" y="1572253"/>
+              <a:ext cx="216000" cy="216000"/>
+            </a:xfrm>
+            <a:prstGeom prst="rect">
+              <a:avLst/>
+            </a:prstGeom>
+            <a:noFill/>
+          </p:spPr>
+          <p:txBody>
+            <a:bodyPr wrap="square" rtlCol="0">
+              <a:spAutoFit/>
+            </a:bodyPr>
+            <a:lstStyle/>
+            <a:p>
+              <a:r>
+                <a:rPr lang="en-US" sz="800" dirty="0">
+                  <a:latin typeface="Calibri" panose="020F0502020204030204" pitchFamily="34" charset="0"/>
+                  <a:cs typeface="Calibri" panose="020F0502020204030204" pitchFamily="34" charset="0"/>
+                </a:rPr>
+                <a:t>o</a:t>
+              </a:r>
+              <a:endParaRPr lang="en-GB" sz="800" dirty="0">
+                <a:latin typeface="Calibri" panose="020F0502020204030204" pitchFamily="34" charset="0"/>
+                <a:cs typeface="Calibri" panose="020F0502020204030204" pitchFamily="34" charset="0"/>
+              </a:endParaRPr>
+            </a:p>
+          </p:txBody>
+        </p:sp>
+        <p:sp>
+          <p:nvSpPr>
+            <p:cNvPr id="59" name="Rectangle 58">
+              <a:extLst>
+                <a:ext uri="{FF2B5EF4-FFF2-40B4-BE49-F238E27FC236}">
+                  <a16:creationId xmlns:a16="http://schemas.microsoft.com/office/drawing/2014/main" id="{79DAD31B-B8D5-6AE0-C5BD-5E021FBBBC71}"/>
+                </a:ext>
+              </a:extLst>
+            </p:cNvPr>
+            <p:cNvSpPr/>
+            <p:nvPr/>
+          </p:nvSpPr>
+          <p:spPr>
+            <a:xfrm>
+              <a:off x="1040747" y="1619373"/>
+              <a:ext cx="144000" cy="144000"/>
+            </a:xfrm>
+            <a:prstGeom prst="rect">
+              <a:avLst/>
+            </a:prstGeom>
+            <a:noFill/>
+            <a:ln w="3175">
+              <a:solidFill>
+                <a:schemeClr val="tx1">
+                  <a:lumMod val="75000"/>
+                  <a:lumOff val="25000"/>
+                </a:schemeClr>
+              </a:solidFill>
+            </a:ln>
+          </p:spPr>
+          <p:style>
+            <a:lnRef idx="2">
+              <a:schemeClr val="accent1">
+                <a:shade val="15000"/>
+              </a:schemeClr>
+            </a:lnRef>
+            <a:fillRef idx="1">
+              <a:schemeClr val="accent1"/>
+            </a:fillRef>
+            <a:effectRef idx="0">
+              <a:schemeClr val="accent1"/>
+            </a:effectRef>
+            <a:fontRef idx="minor">
+              <a:schemeClr val="lt1"/>
+            </a:fontRef>
+          </p:style>
+          <p:txBody>
+            <a:bodyPr rtlCol="0" anchor="ctr"/>
+            <a:lstStyle/>
+            <a:p>
+              <a:pPr algn="ctr"/>
+              <a:endParaRPr lang="en-GB"/>
+            </a:p>
+          </p:txBody>
+        </p:sp>
+      </p:grpSp>
+      <p:grpSp>
+        <p:nvGrpSpPr>
+          <p:cNvPr id="60" name="Group 59">
+            <a:extLst>
+              <a:ext uri="{FF2B5EF4-FFF2-40B4-BE49-F238E27FC236}">
+                <a16:creationId xmlns:a16="http://schemas.microsoft.com/office/drawing/2014/main" id="{D378A3A7-AAE7-AB6B-8325-9765A852F80F}"/>
+              </a:ext>
+            </a:extLst>
+          </p:cNvPr>
+          <p:cNvGrpSpPr/>
+          <p:nvPr/>
+        </p:nvGrpSpPr>
+        <p:grpSpPr>
+          <a:xfrm>
+            <a:off x="3073361" y="4785619"/>
+            <a:ext cx="216000" cy="216000"/>
+            <a:chOff x="1002190" y="1572253"/>
+            <a:chExt cx="216000" cy="216000"/>
+          </a:xfrm>
+        </p:grpSpPr>
+        <p:sp>
+          <p:nvSpPr>
+            <p:cNvPr id="61" name="TextBox 60">
+              <a:extLst>
+                <a:ext uri="{FF2B5EF4-FFF2-40B4-BE49-F238E27FC236}">
+                  <a16:creationId xmlns:a16="http://schemas.microsoft.com/office/drawing/2014/main" id="{FB60F46A-58EA-58C9-F6D7-E3D388D44083}"/>
+                </a:ext>
+              </a:extLst>
+            </p:cNvPr>
+            <p:cNvSpPr txBox="1"/>
+            <p:nvPr/>
+          </p:nvSpPr>
+          <p:spPr>
+            <a:xfrm>
+              <a:off x="1002190" y="1572253"/>
+              <a:ext cx="216000" cy="216000"/>
+            </a:xfrm>
+            <a:prstGeom prst="rect">
+              <a:avLst/>
+            </a:prstGeom>
+            <a:noFill/>
+          </p:spPr>
+          <p:txBody>
+            <a:bodyPr wrap="square" rtlCol="0">
+              <a:spAutoFit/>
+            </a:bodyPr>
+            <a:lstStyle/>
+            <a:p>
+              <a:r>
+                <a:rPr lang="en-US" sz="800" dirty="0">
+                  <a:latin typeface="Calibri" panose="020F0502020204030204" pitchFamily="34" charset="0"/>
+                  <a:cs typeface="Calibri" panose="020F0502020204030204" pitchFamily="34" charset="0"/>
+                </a:rPr>
+                <a:t>p</a:t>
+              </a:r>
+              <a:endParaRPr lang="en-GB" sz="800" dirty="0">
+                <a:latin typeface="Calibri" panose="020F0502020204030204" pitchFamily="34" charset="0"/>
+                <a:cs typeface="Calibri" panose="020F0502020204030204" pitchFamily="34" charset="0"/>
+              </a:endParaRPr>
+            </a:p>
+          </p:txBody>
+        </p:sp>
+        <p:sp>
+          <p:nvSpPr>
+            <p:cNvPr id="62" name="Rectangle 61">
+              <a:extLst>
+                <a:ext uri="{FF2B5EF4-FFF2-40B4-BE49-F238E27FC236}">
+                  <a16:creationId xmlns:a16="http://schemas.microsoft.com/office/drawing/2014/main" id="{502362E7-832F-ABA3-6615-18CFC6FD5FAB}"/>
+                </a:ext>
+              </a:extLst>
+            </p:cNvPr>
+            <p:cNvSpPr/>
+            <p:nvPr/>
+          </p:nvSpPr>
+          <p:spPr>
+            <a:xfrm>
+              <a:off x="1040747" y="1619373"/>
+              <a:ext cx="144000" cy="144000"/>
+            </a:xfrm>
+            <a:prstGeom prst="rect">
+              <a:avLst/>
+            </a:prstGeom>
+            <a:noFill/>
+            <a:ln w="3175">
+              <a:solidFill>
+                <a:schemeClr val="tx1">
+                  <a:lumMod val="75000"/>
+                  <a:lumOff val="25000"/>
+                </a:schemeClr>
+              </a:solidFill>
+            </a:ln>
+          </p:spPr>
+          <p:style>
+            <a:lnRef idx="2">
+              <a:schemeClr val="accent1">
+                <a:shade val="15000"/>
+              </a:schemeClr>
+            </a:lnRef>
+            <a:fillRef idx="1">
+              <a:schemeClr val="accent1"/>
+            </a:fillRef>
+            <a:effectRef idx="0">
+              <a:schemeClr val="accent1"/>
+            </a:effectRef>
+            <a:fontRef idx="minor">
+              <a:schemeClr val="lt1"/>
+            </a:fontRef>
+          </p:style>
+          <p:txBody>
+            <a:bodyPr rtlCol="0" anchor="ctr"/>
+            <a:lstStyle/>
+            <a:p>
+              <a:pPr algn="ctr"/>
+              <a:endParaRPr lang="en-GB"/>
+            </a:p>
+          </p:txBody>
+        </p:sp>
+      </p:grpSp>
+      <p:grpSp>
+        <p:nvGrpSpPr>
+          <p:cNvPr id="63" name="Group 62">
+            <a:extLst>
+              <a:ext uri="{FF2B5EF4-FFF2-40B4-BE49-F238E27FC236}">
+                <a16:creationId xmlns:a16="http://schemas.microsoft.com/office/drawing/2014/main" id="{BDE97180-8A29-C88B-B311-50C7B4019697}"/>
+              </a:ext>
+            </a:extLst>
+          </p:cNvPr>
+          <p:cNvGrpSpPr/>
+          <p:nvPr/>
+        </p:nvGrpSpPr>
+        <p:grpSpPr>
+          <a:xfrm>
+            <a:off x="3073361" y="5762038"/>
+            <a:ext cx="216000" cy="216000"/>
+            <a:chOff x="1002190" y="1572253"/>
+            <a:chExt cx="216000" cy="216000"/>
+          </a:xfrm>
+        </p:grpSpPr>
+        <p:sp>
+          <p:nvSpPr>
+            <p:cNvPr id="64" name="TextBox 63">
+              <a:extLst>
+                <a:ext uri="{FF2B5EF4-FFF2-40B4-BE49-F238E27FC236}">
+                  <a16:creationId xmlns:a16="http://schemas.microsoft.com/office/drawing/2014/main" id="{68D7FA88-D154-4918-E50B-5715A02DF21E}"/>
+                </a:ext>
+              </a:extLst>
+            </p:cNvPr>
+            <p:cNvSpPr txBox="1"/>
+            <p:nvPr/>
+          </p:nvSpPr>
+          <p:spPr>
+            <a:xfrm>
+              <a:off x="1002190" y="1572253"/>
+              <a:ext cx="216000" cy="216000"/>
+            </a:xfrm>
+            <a:prstGeom prst="rect">
+              <a:avLst/>
+            </a:prstGeom>
+            <a:noFill/>
+          </p:spPr>
+          <p:txBody>
+            <a:bodyPr wrap="square" rtlCol="0">
+              <a:spAutoFit/>
+            </a:bodyPr>
+            <a:lstStyle/>
+            <a:p>
+              <a:r>
+                <a:rPr lang="en-US" sz="800" dirty="0">
+                  <a:latin typeface="Calibri" panose="020F0502020204030204" pitchFamily="34" charset="0"/>
+                  <a:cs typeface="Calibri" panose="020F0502020204030204" pitchFamily="34" charset="0"/>
+                </a:rPr>
+                <a:t>q</a:t>
+              </a:r>
+              <a:endParaRPr lang="en-GB" sz="800" dirty="0">
+                <a:latin typeface="Calibri" panose="020F0502020204030204" pitchFamily="34" charset="0"/>
+                <a:cs typeface="Calibri" panose="020F0502020204030204" pitchFamily="34" charset="0"/>
+              </a:endParaRPr>
+            </a:p>
+          </p:txBody>
+        </p:sp>
+        <p:sp>
+          <p:nvSpPr>
+            <p:cNvPr id="65" name="Rectangle 64">
+              <a:extLst>
+                <a:ext uri="{FF2B5EF4-FFF2-40B4-BE49-F238E27FC236}">
+                  <a16:creationId xmlns:a16="http://schemas.microsoft.com/office/drawing/2014/main" id="{05F4BE14-5E2D-9A45-EDD1-F739B7D14832}"/>
+                </a:ext>
+              </a:extLst>
+            </p:cNvPr>
+            <p:cNvSpPr/>
+            <p:nvPr/>
+          </p:nvSpPr>
+          <p:spPr>
+            <a:xfrm>
+              <a:off x="1040747" y="1619373"/>
+              <a:ext cx="144000" cy="144000"/>
+            </a:xfrm>
+            <a:prstGeom prst="rect">
+              <a:avLst/>
+            </a:prstGeom>
+            <a:noFill/>
+            <a:ln w="3175">
+              <a:solidFill>
+                <a:schemeClr val="tx1">
+                  <a:lumMod val="75000"/>
+                  <a:lumOff val="25000"/>
+                </a:schemeClr>
+              </a:solidFill>
+            </a:ln>
+          </p:spPr>
+          <p:style>
+            <a:lnRef idx="2">
+              <a:schemeClr val="accent1">
+                <a:shade val="15000"/>
+              </a:schemeClr>
+            </a:lnRef>
+            <a:fillRef idx="1">
+              <a:schemeClr val="accent1"/>
+            </a:fillRef>
+            <a:effectRef idx="0">
+              <a:schemeClr val="accent1"/>
+            </a:effectRef>
+            <a:fontRef idx="minor">
+              <a:schemeClr val="lt1"/>
+            </a:fontRef>
+          </p:style>
+          <p:txBody>
+            <a:bodyPr rtlCol="0" anchor="ctr"/>
+            <a:lstStyle/>
+            <a:p>
+              <a:pPr algn="ctr"/>
+              <a:endParaRPr lang="en-GB"/>
+            </a:p>
+          </p:txBody>
+        </p:sp>
+      </p:grpSp>
+      <p:grpSp>
+        <p:nvGrpSpPr>
+          <p:cNvPr id="66" name="Group 65">
+            <a:extLst>
+              <a:ext uri="{FF2B5EF4-FFF2-40B4-BE49-F238E27FC236}">
+                <a16:creationId xmlns:a16="http://schemas.microsoft.com/office/drawing/2014/main" id="{790A4AB4-7F81-314A-FA70-34C0CD0DFD61}"/>
+              </a:ext>
+            </a:extLst>
+          </p:cNvPr>
+          <p:cNvGrpSpPr/>
+          <p:nvPr/>
+        </p:nvGrpSpPr>
+        <p:grpSpPr>
+          <a:xfrm>
+            <a:off x="3073361" y="6738459"/>
+            <a:ext cx="216000" cy="216000"/>
+            <a:chOff x="1002190" y="1572253"/>
+            <a:chExt cx="216000" cy="216000"/>
+          </a:xfrm>
+        </p:grpSpPr>
+        <p:sp>
+          <p:nvSpPr>
+            <p:cNvPr id="68" name="TextBox 67">
+              <a:extLst>
+                <a:ext uri="{FF2B5EF4-FFF2-40B4-BE49-F238E27FC236}">
+                  <a16:creationId xmlns:a16="http://schemas.microsoft.com/office/drawing/2014/main" id="{44939526-7468-A7B7-5B89-2007C764E458}"/>
+                </a:ext>
+              </a:extLst>
+            </p:cNvPr>
+            <p:cNvSpPr txBox="1"/>
+            <p:nvPr/>
+          </p:nvSpPr>
+          <p:spPr>
+            <a:xfrm>
+              <a:off x="1002190" y="1572253"/>
+              <a:ext cx="216000" cy="216000"/>
+            </a:xfrm>
+            <a:prstGeom prst="rect">
+              <a:avLst/>
+            </a:prstGeom>
+            <a:noFill/>
+          </p:spPr>
+          <p:txBody>
+            <a:bodyPr wrap="square" rtlCol="0">
+              <a:spAutoFit/>
+            </a:bodyPr>
+            <a:lstStyle/>
+            <a:p>
+              <a:r>
+                <a:rPr lang="en-US" sz="800" dirty="0">
+                  <a:latin typeface="Calibri" panose="020F0502020204030204" pitchFamily="34" charset="0"/>
+                  <a:cs typeface="Calibri" panose="020F0502020204030204" pitchFamily="34" charset="0"/>
+                </a:rPr>
+                <a:t>r</a:t>
+              </a:r>
+              <a:endParaRPr lang="en-GB" sz="800" dirty="0">
+                <a:latin typeface="Calibri" panose="020F0502020204030204" pitchFamily="34" charset="0"/>
+                <a:cs typeface="Calibri" panose="020F0502020204030204" pitchFamily="34" charset="0"/>
+              </a:endParaRPr>
+            </a:p>
+          </p:txBody>
+        </p:sp>
+        <p:sp>
+          <p:nvSpPr>
+            <p:cNvPr id="70" name="Rectangle 69">
+              <a:extLst>
+                <a:ext uri="{FF2B5EF4-FFF2-40B4-BE49-F238E27FC236}">
+                  <a16:creationId xmlns:a16="http://schemas.microsoft.com/office/drawing/2014/main" id="{7DD7C053-9EBD-75EA-76D3-C80657A543FE}"/>
+                </a:ext>
+              </a:extLst>
+            </p:cNvPr>
+            <p:cNvSpPr/>
+            <p:nvPr/>
+          </p:nvSpPr>
+          <p:spPr>
+            <a:xfrm>
+              <a:off x="1040747" y="1619373"/>
+              <a:ext cx="144000" cy="144000"/>
+            </a:xfrm>
+            <a:prstGeom prst="rect">
+              <a:avLst/>
+            </a:prstGeom>
+            <a:noFill/>
+            <a:ln w="3175">
+              <a:solidFill>
+                <a:schemeClr val="tx1">
+                  <a:lumMod val="75000"/>
+                  <a:lumOff val="25000"/>
+                </a:schemeClr>
+              </a:solidFill>
+            </a:ln>
+          </p:spPr>
+          <p:style>
+            <a:lnRef idx="2">
+              <a:schemeClr val="accent1">
+                <a:shade val="15000"/>
+              </a:schemeClr>
+            </a:lnRef>
+            <a:fillRef idx="1">
+              <a:schemeClr val="accent1"/>
+            </a:fillRef>
+            <a:effectRef idx="0">
+              <a:schemeClr val="accent1"/>
+            </a:effectRef>
+            <a:fontRef idx="minor">
+              <a:schemeClr val="lt1"/>
+            </a:fontRef>
+          </p:style>
+          <p:txBody>
+            <a:bodyPr rtlCol="0" anchor="ctr"/>
+            <a:lstStyle/>
+            <a:p>
+              <a:pPr algn="ctr"/>
+              <a:endParaRPr lang="en-GB"/>
+            </a:p>
+          </p:txBody>
+        </p:sp>
+      </p:grpSp>
+      <p:grpSp>
+        <p:nvGrpSpPr>
+          <p:cNvPr id="72" name="Group 71">
+            <a:extLst>
+              <a:ext uri="{FF2B5EF4-FFF2-40B4-BE49-F238E27FC236}">
+                <a16:creationId xmlns:a16="http://schemas.microsoft.com/office/drawing/2014/main" id="{1EDBFB11-5188-9FC6-50C8-E2569BBB14ED}"/>
+              </a:ext>
+            </a:extLst>
+          </p:cNvPr>
+          <p:cNvGrpSpPr/>
+          <p:nvPr/>
+        </p:nvGrpSpPr>
+        <p:grpSpPr>
+          <a:xfrm>
+            <a:off x="4070652" y="1856362"/>
+            <a:ext cx="216000" cy="216000"/>
+            <a:chOff x="1002190" y="1572253"/>
+            <a:chExt cx="216000" cy="216000"/>
+          </a:xfrm>
+        </p:grpSpPr>
+        <p:sp>
+          <p:nvSpPr>
+            <p:cNvPr id="74" name="TextBox 73">
+              <a:extLst>
+                <a:ext uri="{FF2B5EF4-FFF2-40B4-BE49-F238E27FC236}">
+                  <a16:creationId xmlns:a16="http://schemas.microsoft.com/office/drawing/2014/main" id="{257E3DA0-B59E-7DCC-A5B2-0973C22E5AAB}"/>
+                </a:ext>
+              </a:extLst>
+            </p:cNvPr>
+            <p:cNvSpPr txBox="1"/>
+            <p:nvPr/>
+          </p:nvSpPr>
+          <p:spPr>
+            <a:xfrm>
+              <a:off x="1002190" y="1572253"/>
+              <a:ext cx="216000" cy="216000"/>
+            </a:xfrm>
+            <a:prstGeom prst="rect">
+              <a:avLst/>
+            </a:prstGeom>
+            <a:noFill/>
+          </p:spPr>
+          <p:txBody>
+            <a:bodyPr wrap="square" rtlCol="0">
+              <a:spAutoFit/>
+            </a:bodyPr>
+            <a:lstStyle/>
+            <a:p>
+              <a:r>
+                <a:rPr lang="en-US" sz="800" dirty="0">
+                  <a:latin typeface="Calibri" panose="020F0502020204030204" pitchFamily="34" charset="0"/>
+                  <a:cs typeface="Calibri" panose="020F0502020204030204" pitchFamily="34" charset="0"/>
+                </a:rPr>
+                <a:t>s</a:t>
+              </a:r>
+              <a:endParaRPr lang="en-GB" sz="800" dirty="0">
+                <a:latin typeface="Calibri" panose="020F0502020204030204" pitchFamily="34" charset="0"/>
+                <a:cs typeface="Calibri" panose="020F0502020204030204" pitchFamily="34" charset="0"/>
+              </a:endParaRPr>
+            </a:p>
+          </p:txBody>
+        </p:sp>
+        <p:sp>
+          <p:nvSpPr>
+            <p:cNvPr id="76" name="Rectangle 75">
+              <a:extLst>
+                <a:ext uri="{FF2B5EF4-FFF2-40B4-BE49-F238E27FC236}">
+                  <a16:creationId xmlns:a16="http://schemas.microsoft.com/office/drawing/2014/main" id="{7ECA1989-89DB-E611-4EEE-72E511C9D1F5}"/>
+                </a:ext>
+              </a:extLst>
+            </p:cNvPr>
+            <p:cNvSpPr/>
+            <p:nvPr/>
+          </p:nvSpPr>
+          <p:spPr>
+            <a:xfrm>
+              <a:off x="1040747" y="1619373"/>
+              <a:ext cx="144000" cy="144000"/>
+            </a:xfrm>
+            <a:prstGeom prst="rect">
+              <a:avLst/>
+            </a:prstGeom>
+            <a:noFill/>
+            <a:ln w="3175">
+              <a:solidFill>
+                <a:schemeClr val="tx1">
+                  <a:lumMod val="75000"/>
+                  <a:lumOff val="25000"/>
+                </a:schemeClr>
+              </a:solidFill>
+            </a:ln>
+          </p:spPr>
+          <p:style>
+            <a:lnRef idx="2">
+              <a:schemeClr val="accent1">
+                <a:shade val="15000"/>
+              </a:schemeClr>
+            </a:lnRef>
+            <a:fillRef idx="1">
+              <a:schemeClr val="accent1"/>
+            </a:fillRef>
+            <a:effectRef idx="0">
+              <a:schemeClr val="accent1"/>
+            </a:effectRef>
+            <a:fontRef idx="minor">
+              <a:schemeClr val="lt1"/>
+            </a:fontRef>
+          </p:style>
+          <p:txBody>
+            <a:bodyPr rtlCol="0" anchor="ctr"/>
+            <a:lstStyle/>
+            <a:p>
+              <a:pPr algn="ctr"/>
+              <a:endParaRPr lang="en-GB"/>
+            </a:p>
+          </p:txBody>
+        </p:sp>
+      </p:grpSp>
+      <p:grpSp>
+        <p:nvGrpSpPr>
+          <p:cNvPr id="78" name="Group 77">
+            <a:extLst>
+              <a:ext uri="{FF2B5EF4-FFF2-40B4-BE49-F238E27FC236}">
+                <a16:creationId xmlns:a16="http://schemas.microsoft.com/office/drawing/2014/main" id="{3D63ABEF-BBCE-6F9A-18D1-CC4AE41DAE26}"/>
+              </a:ext>
+            </a:extLst>
+          </p:cNvPr>
+          <p:cNvGrpSpPr/>
+          <p:nvPr/>
+        </p:nvGrpSpPr>
+        <p:grpSpPr>
+          <a:xfrm>
+            <a:off x="4070652" y="2832781"/>
+            <a:ext cx="216000" cy="216000"/>
+            <a:chOff x="1002190" y="1572253"/>
+            <a:chExt cx="216000" cy="216000"/>
+          </a:xfrm>
+        </p:grpSpPr>
+        <p:sp>
+          <p:nvSpPr>
+            <p:cNvPr id="80" name="TextBox 79">
+              <a:extLst>
+                <a:ext uri="{FF2B5EF4-FFF2-40B4-BE49-F238E27FC236}">
+                  <a16:creationId xmlns:a16="http://schemas.microsoft.com/office/drawing/2014/main" id="{EC3B9409-F0E8-ADF7-7C9A-8B355427CF99}"/>
+                </a:ext>
+              </a:extLst>
+            </p:cNvPr>
+            <p:cNvSpPr txBox="1"/>
+            <p:nvPr/>
+          </p:nvSpPr>
+          <p:spPr>
+            <a:xfrm>
+              <a:off x="1002190" y="1572253"/>
+              <a:ext cx="216000" cy="216000"/>
+            </a:xfrm>
+            <a:prstGeom prst="rect">
+              <a:avLst/>
+            </a:prstGeom>
+            <a:noFill/>
+          </p:spPr>
+          <p:txBody>
+            <a:bodyPr wrap="square" rtlCol="0">
+              <a:spAutoFit/>
+            </a:bodyPr>
+            <a:lstStyle/>
+            <a:p>
+              <a:r>
+                <a:rPr lang="en-US" sz="800" dirty="0">
+                  <a:latin typeface="Calibri" panose="020F0502020204030204" pitchFamily="34" charset="0"/>
+                  <a:cs typeface="Calibri" panose="020F0502020204030204" pitchFamily="34" charset="0"/>
+                </a:rPr>
+                <a:t>t</a:t>
+              </a:r>
+              <a:endParaRPr lang="en-GB" sz="800" dirty="0">
+                <a:latin typeface="Calibri" panose="020F0502020204030204" pitchFamily="34" charset="0"/>
+                <a:cs typeface="Calibri" panose="020F0502020204030204" pitchFamily="34" charset="0"/>
+              </a:endParaRPr>
+            </a:p>
+          </p:txBody>
+        </p:sp>
+        <p:sp>
+          <p:nvSpPr>
+            <p:cNvPr id="82" name="Rectangle 81">
+              <a:extLst>
+                <a:ext uri="{FF2B5EF4-FFF2-40B4-BE49-F238E27FC236}">
+                  <a16:creationId xmlns:a16="http://schemas.microsoft.com/office/drawing/2014/main" id="{0AB36BDF-5A23-B483-651D-E8C7160B27F9}"/>
+                </a:ext>
+              </a:extLst>
+            </p:cNvPr>
+            <p:cNvSpPr/>
+            <p:nvPr/>
+          </p:nvSpPr>
+          <p:spPr>
+            <a:xfrm>
+              <a:off x="1040747" y="1619373"/>
+              <a:ext cx="144000" cy="144000"/>
+            </a:xfrm>
+            <a:prstGeom prst="rect">
+              <a:avLst/>
+            </a:prstGeom>
+            <a:noFill/>
+            <a:ln w="3175">
+              <a:solidFill>
+                <a:schemeClr val="tx1">
+                  <a:lumMod val="75000"/>
+                  <a:lumOff val="25000"/>
+                </a:schemeClr>
+              </a:solidFill>
+            </a:ln>
+          </p:spPr>
+          <p:style>
+            <a:lnRef idx="2">
+              <a:schemeClr val="accent1">
+                <a:shade val="15000"/>
+              </a:schemeClr>
+            </a:lnRef>
+            <a:fillRef idx="1">
+              <a:schemeClr val="accent1"/>
+            </a:fillRef>
+            <a:effectRef idx="0">
+              <a:schemeClr val="accent1"/>
+            </a:effectRef>
+            <a:fontRef idx="minor">
+              <a:schemeClr val="lt1"/>
+            </a:fontRef>
+          </p:style>
+          <p:txBody>
+            <a:bodyPr rtlCol="0" anchor="ctr"/>
+            <a:lstStyle/>
+            <a:p>
+              <a:pPr algn="ctr"/>
+              <a:endParaRPr lang="en-GB"/>
+            </a:p>
+          </p:txBody>
+        </p:sp>
+      </p:grpSp>
+      <p:grpSp>
+        <p:nvGrpSpPr>
+          <p:cNvPr id="84" name="Group 83">
+            <a:extLst>
+              <a:ext uri="{FF2B5EF4-FFF2-40B4-BE49-F238E27FC236}">
+                <a16:creationId xmlns:a16="http://schemas.microsoft.com/office/drawing/2014/main" id="{9856C7DD-5D2B-9057-4BDA-C9B1ABE8426E}"/>
+              </a:ext>
+            </a:extLst>
+          </p:cNvPr>
+          <p:cNvGrpSpPr/>
+          <p:nvPr/>
+        </p:nvGrpSpPr>
+        <p:grpSpPr>
+          <a:xfrm>
+            <a:off x="4070652" y="3809200"/>
+            <a:ext cx="216000" cy="216000"/>
+            <a:chOff x="1002190" y="1572253"/>
+            <a:chExt cx="216000" cy="216000"/>
+          </a:xfrm>
+        </p:grpSpPr>
+        <p:sp>
+          <p:nvSpPr>
+            <p:cNvPr id="86" name="TextBox 85">
+              <a:extLst>
+                <a:ext uri="{FF2B5EF4-FFF2-40B4-BE49-F238E27FC236}">
+                  <a16:creationId xmlns:a16="http://schemas.microsoft.com/office/drawing/2014/main" id="{B9AFEDB8-D935-976A-4635-6D243D5AD275}"/>
+                </a:ext>
+              </a:extLst>
+            </p:cNvPr>
+            <p:cNvSpPr txBox="1"/>
+            <p:nvPr/>
+          </p:nvSpPr>
+          <p:spPr>
+            <a:xfrm>
+              <a:off x="1002190" y="1572253"/>
+              <a:ext cx="216000" cy="216000"/>
+            </a:xfrm>
+            <a:prstGeom prst="rect">
+              <a:avLst/>
+            </a:prstGeom>
+            <a:noFill/>
+          </p:spPr>
+          <p:txBody>
+            <a:bodyPr wrap="square" rtlCol="0">
+              <a:spAutoFit/>
+            </a:bodyPr>
+            <a:lstStyle/>
+            <a:p>
+              <a:r>
+                <a:rPr lang="en-US" sz="800" dirty="0">
+                  <a:latin typeface="Calibri" panose="020F0502020204030204" pitchFamily="34" charset="0"/>
+                  <a:cs typeface="Calibri" panose="020F0502020204030204" pitchFamily="34" charset="0"/>
+                </a:rPr>
+                <a:t>u</a:t>
+              </a:r>
+              <a:endParaRPr lang="en-GB" sz="800" dirty="0">
+                <a:latin typeface="Calibri" panose="020F0502020204030204" pitchFamily="34" charset="0"/>
+                <a:cs typeface="Calibri" panose="020F0502020204030204" pitchFamily="34" charset="0"/>
+              </a:endParaRPr>
+            </a:p>
+          </p:txBody>
+        </p:sp>
+        <p:sp>
+          <p:nvSpPr>
+            <p:cNvPr id="88" name="Rectangle 87">
+              <a:extLst>
+                <a:ext uri="{FF2B5EF4-FFF2-40B4-BE49-F238E27FC236}">
+                  <a16:creationId xmlns:a16="http://schemas.microsoft.com/office/drawing/2014/main" id="{0E057C5B-551D-693B-0E77-CD6F253E5C61}"/>
+                </a:ext>
+              </a:extLst>
+            </p:cNvPr>
+            <p:cNvSpPr/>
+            <p:nvPr/>
+          </p:nvSpPr>
+          <p:spPr>
+            <a:xfrm>
+              <a:off x="1040747" y="1619373"/>
+              <a:ext cx="144000" cy="144000"/>
+            </a:xfrm>
+            <a:prstGeom prst="rect">
+              <a:avLst/>
+            </a:prstGeom>
+            <a:noFill/>
+            <a:ln w="3175">
+              <a:solidFill>
+                <a:schemeClr val="tx1">
+                  <a:lumMod val="75000"/>
+                  <a:lumOff val="25000"/>
+                </a:schemeClr>
+              </a:solidFill>
+            </a:ln>
+          </p:spPr>
+          <p:style>
+            <a:lnRef idx="2">
+              <a:schemeClr val="accent1">
+                <a:shade val="15000"/>
+              </a:schemeClr>
+            </a:lnRef>
+            <a:fillRef idx="1">
+              <a:schemeClr val="accent1"/>
+            </a:fillRef>
+            <a:effectRef idx="0">
+              <a:schemeClr val="accent1"/>
+            </a:effectRef>
+            <a:fontRef idx="minor">
+              <a:schemeClr val="lt1"/>
+            </a:fontRef>
+          </p:style>
+          <p:txBody>
+            <a:bodyPr rtlCol="0" anchor="ctr"/>
+            <a:lstStyle/>
+            <a:p>
+              <a:pPr algn="ctr"/>
+              <a:endParaRPr lang="en-GB"/>
+            </a:p>
+          </p:txBody>
+        </p:sp>
+      </p:grpSp>
+      <p:grpSp>
+        <p:nvGrpSpPr>
+          <p:cNvPr id="90" name="Group 89">
+            <a:extLst>
+              <a:ext uri="{FF2B5EF4-FFF2-40B4-BE49-F238E27FC236}">
+                <a16:creationId xmlns:a16="http://schemas.microsoft.com/office/drawing/2014/main" id="{A24E96C9-7A45-BC3E-F02D-7303E1E9BBB2}"/>
+              </a:ext>
+            </a:extLst>
+          </p:cNvPr>
+          <p:cNvGrpSpPr/>
+          <p:nvPr/>
+        </p:nvGrpSpPr>
+        <p:grpSpPr>
+          <a:xfrm>
+            <a:off x="4070652" y="4785619"/>
+            <a:ext cx="216000" cy="216000"/>
+            <a:chOff x="1002190" y="1572253"/>
+            <a:chExt cx="216000" cy="216000"/>
+          </a:xfrm>
+        </p:grpSpPr>
+        <p:sp>
+          <p:nvSpPr>
+            <p:cNvPr id="92" name="TextBox 91">
+              <a:extLst>
+                <a:ext uri="{FF2B5EF4-FFF2-40B4-BE49-F238E27FC236}">
+                  <a16:creationId xmlns:a16="http://schemas.microsoft.com/office/drawing/2014/main" id="{61E48108-8734-B775-67E5-90F64B3BDE7B}"/>
+                </a:ext>
+              </a:extLst>
+            </p:cNvPr>
+            <p:cNvSpPr txBox="1"/>
+            <p:nvPr/>
+          </p:nvSpPr>
+          <p:spPr>
+            <a:xfrm>
+              <a:off x="1002190" y="1572253"/>
+              <a:ext cx="216000" cy="216000"/>
+            </a:xfrm>
+            <a:prstGeom prst="rect">
+              <a:avLst/>
+            </a:prstGeom>
+            <a:noFill/>
+          </p:spPr>
+          <p:txBody>
+            <a:bodyPr wrap="square" rtlCol="0">
+              <a:spAutoFit/>
+            </a:bodyPr>
+            <a:lstStyle/>
+            <a:p>
+              <a:r>
+                <a:rPr lang="en-US" sz="800" dirty="0">
+                  <a:latin typeface="Calibri" panose="020F0502020204030204" pitchFamily="34" charset="0"/>
+                  <a:cs typeface="Calibri" panose="020F0502020204030204" pitchFamily="34" charset="0"/>
+                </a:rPr>
+                <a:t>v</a:t>
+              </a:r>
+              <a:endParaRPr lang="en-GB" sz="800" dirty="0">
+                <a:latin typeface="Calibri" panose="020F0502020204030204" pitchFamily="34" charset="0"/>
+                <a:cs typeface="Calibri" panose="020F0502020204030204" pitchFamily="34" charset="0"/>
+              </a:endParaRPr>
+            </a:p>
+          </p:txBody>
+        </p:sp>
+        <p:sp>
+          <p:nvSpPr>
+            <p:cNvPr id="94" name="Rectangle 93">
+              <a:extLst>
+                <a:ext uri="{FF2B5EF4-FFF2-40B4-BE49-F238E27FC236}">
+                  <a16:creationId xmlns:a16="http://schemas.microsoft.com/office/drawing/2014/main" id="{A98BA35E-620C-6181-D52A-42C047486931}"/>
+                </a:ext>
+              </a:extLst>
+            </p:cNvPr>
+            <p:cNvSpPr/>
+            <p:nvPr/>
+          </p:nvSpPr>
+          <p:spPr>
+            <a:xfrm>
+              <a:off x="1040747" y="1619373"/>
+              <a:ext cx="144000" cy="144000"/>
+            </a:xfrm>
+            <a:prstGeom prst="rect">
+              <a:avLst/>
+            </a:prstGeom>
+            <a:noFill/>
+            <a:ln w="3175">
+              <a:solidFill>
+                <a:schemeClr val="tx1">
+                  <a:lumMod val="75000"/>
+                  <a:lumOff val="25000"/>
+                </a:schemeClr>
+              </a:solidFill>
+            </a:ln>
+          </p:spPr>
+          <p:style>
+            <a:lnRef idx="2">
+              <a:schemeClr val="accent1">
+                <a:shade val="15000"/>
+              </a:schemeClr>
+            </a:lnRef>
+            <a:fillRef idx="1">
+              <a:schemeClr val="accent1"/>
+            </a:fillRef>
+            <a:effectRef idx="0">
+              <a:schemeClr val="accent1"/>
+            </a:effectRef>
+            <a:fontRef idx="minor">
+              <a:schemeClr val="lt1"/>
+            </a:fontRef>
+          </p:style>
+          <p:txBody>
+            <a:bodyPr rtlCol="0" anchor="ctr"/>
+            <a:lstStyle/>
+            <a:p>
+              <a:pPr algn="ctr"/>
+              <a:endParaRPr lang="en-GB"/>
+            </a:p>
+          </p:txBody>
+        </p:sp>
+      </p:grpSp>
+      <p:grpSp>
+        <p:nvGrpSpPr>
+          <p:cNvPr id="96" name="Group 95">
+            <a:extLst>
+              <a:ext uri="{FF2B5EF4-FFF2-40B4-BE49-F238E27FC236}">
+                <a16:creationId xmlns:a16="http://schemas.microsoft.com/office/drawing/2014/main" id="{1F582236-5FFE-D0AF-6BC2-25714F273B5D}"/>
+              </a:ext>
+            </a:extLst>
+          </p:cNvPr>
+          <p:cNvGrpSpPr/>
+          <p:nvPr/>
+        </p:nvGrpSpPr>
+        <p:grpSpPr>
+          <a:xfrm>
+            <a:off x="4070652" y="5762038"/>
+            <a:ext cx="216000" cy="216000"/>
+            <a:chOff x="1002190" y="1572253"/>
+            <a:chExt cx="216000" cy="216000"/>
+          </a:xfrm>
+        </p:grpSpPr>
+        <p:sp>
+          <p:nvSpPr>
+            <p:cNvPr id="98" name="TextBox 97">
+              <a:extLst>
+                <a:ext uri="{FF2B5EF4-FFF2-40B4-BE49-F238E27FC236}">
+                  <a16:creationId xmlns:a16="http://schemas.microsoft.com/office/drawing/2014/main" id="{40EC0B94-FC3D-5F55-E23D-CFEEB2FD3B12}"/>
+                </a:ext>
+              </a:extLst>
+            </p:cNvPr>
+            <p:cNvSpPr txBox="1"/>
+            <p:nvPr/>
+          </p:nvSpPr>
+          <p:spPr>
+            <a:xfrm>
+              <a:off x="1002190" y="1572253"/>
+              <a:ext cx="216000" cy="216000"/>
+            </a:xfrm>
+            <a:prstGeom prst="rect">
+              <a:avLst/>
+            </a:prstGeom>
+            <a:noFill/>
+          </p:spPr>
+          <p:txBody>
+            <a:bodyPr wrap="square" rtlCol="0">
+              <a:spAutoFit/>
+            </a:bodyPr>
+            <a:lstStyle/>
+            <a:p>
+              <a:r>
+                <a:rPr lang="en-US" sz="800" dirty="0">
+                  <a:latin typeface="Calibri" panose="020F0502020204030204" pitchFamily="34" charset="0"/>
+                  <a:cs typeface="Calibri" panose="020F0502020204030204" pitchFamily="34" charset="0"/>
+                </a:rPr>
+                <a:t>w</a:t>
+              </a:r>
+              <a:endParaRPr lang="en-GB" sz="800" dirty="0">
+                <a:latin typeface="Calibri" panose="020F0502020204030204" pitchFamily="34" charset="0"/>
+                <a:cs typeface="Calibri" panose="020F0502020204030204" pitchFamily="34" charset="0"/>
+              </a:endParaRPr>
+            </a:p>
+          </p:txBody>
+        </p:sp>
+        <p:sp>
+          <p:nvSpPr>
+            <p:cNvPr id="100" name="Rectangle 99">
+              <a:extLst>
+                <a:ext uri="{FF2B5EF4-FFF2-40B4-BE49-F238E27FC236}">
+                  <a16:creationId xmlns:a16="http://schemas.microsoft.com/office/drawing/2014/main" id="{50834067-1769-D239-47BA-25DD32455FE2}"/>
+                </a:ext>
+              </a:extLst>
+            </p:cNvPr>
+            <p:cNvSpPr/>
+            <p:nvPr/>
+          </p:nvSpPr>
+          <p:spPr>
+            <a:xfrm>
+              <a:off x="1040747" y="1619373"/>
+              <a:ext cx="144000" cy="144000"/>
+            </a:xfrm>
+            <a:prstGeom prst="rect">
+              <a:avLst/>
+            </a:prstGeom>
+            <a:noFill/>
+            <a:ln w="3175">
+              <a:solidFill>
+                <a:schemeClr val="tx1">
+                  <a:lumMod val="75000"/>
+                  <a:lumOff val="25000"/>
+                </a:schemeClr>
+              </a:solidFill>
+            </a:ln>
+          </p:spPr>
+          <p:style>
+            <a:lnRef idx="2">
+              <a:schemeClr val="accent1">
+                <a:shade val="15000"/>
+              </a:schemeClr>
+            </a:lnRef>
+            <a:fillRef idx="1">
+              <a:schemeClr val="accent1"/>
+            </a:fillRef>
+            <a:effectRef idx="0">
+              <a:schemeClr val="accent1"/>
+            </a:effectRef>
+            <a:fontRef idx="minor">
+              <a:schemeClr val="lt1"/>
+            </a:fontRef>
+          </p:style>
+          <p:txBody>
+            <a:bodyPr rtlCol="0" anchor="ctr"/>
+            <a:lstStyle/>
+            <a:p>
+              <a:pPr algn="ctr"/>
+              <a:endParaRPr lang="en-GB"/>
+            </a:p>
+          </p:txBody>
+        </p:sp>
+      </p:grpSp>
+      <p:grpSp>
+        <p:nvGrpSpPr>
+          <p:cNvPr id="102" name="Group 101">
+            <a:extLst>
+              <a:ext uri="{FF2B5EF4-FFF2-40B4-BE49-F238E27FC236}">
+                <a16:creationId xmlns:a16="http://schemas.microsoft.com/office/drawing/2014/main" id="{BAD1792E-49D2-AE6D-FD4E-85776A04D127}"/>
+              </a:ext>
+            </a:extLst>
+          </p:cNvPr>
+          <p:cNvGrpSpPr/>
+          <p:nvPr/>
+        </p:nvGrpSpPr>
+        <p:grpSpPr>
+          <a:xfrm>
+            <a:off x="4070652" y="6738459"/>
+            <a:ext cx="216000" cy="216000"/>
+            <a:chOff x="1002190" y="1572253"/>
+            <a:chExt cx="216000" cy="216000"/>
+          </a:xfrm>
+        </p:grpSpPr>
+        <p:sp>
+          <p:nvSpPr>
+            <p:cNvPr id="104" name="TextBox 103">
+              <a:extLst>
+                <a:ext uri="{FF2B5EF4-FFF2-40B4-BE49-F238E27FC236}">
+                  <a16:creationId xmlns:a16="http://schemas.microsoft.com/office/drawing/2014/main" id="{25506910-7CA7-8883-0A19-A896F88D8503}"/>
+                </a:ext>
+              </a:extLst>
+            </p:cNvPr>
+            <p:cNvSpPr txBox="1"/>
+            <p:nvPr/>
+          </p:nvSpPr>
+          <p:spPr>
+            <a:xfrm>
+              <a:off x="1002190" y="1572253"/>
+              <a:ext cx="216000" cy="216000"/>
+            </a:xfrm>
+            <a:prstGeom prst="rect">
+              <a:avLst/>
+            </a:prstGeom>
+            <a:noFill/>
+          </p:spPr>
+          <p:txBody>
+            <a:bodyPr wrap="square" rtlCol="0">
+              <a:spAutoFit/>
+            </a:bodyPr>
+            <a:lstStyle/>
+            <a:p>
+              <a:r>
+                <a:rPr lang="en-US" sz="800" dirty="0">
+                  <a:latin typeface="Calibri" panose="020F0502020204030204" pitchFamily="34" charset="0"/>
+                  <a:cs typeface="Calibri" panose="020F0502020204030204" pitchFamily="34" charset="0"/>
+                </a:rPr>
+                <a:t>x</a:t>
+              </a:r>
+              <a:endParaRPr lang="en-GB" sz="800" dirty="0">
+                <a:latin typeface="Calibri" panose="020F0502020204030204" pitchFamily="34" charset="0"/>
+                <a:cs typeface="Calibri" panose="020F0502020204030204" pitchFamily="34" charset="0"/>
+              </a:endParaRPr>
+            </a:p>
+          </p:txBody>
+        </p:sp>
+        <p:sp>
+          <p:nvSpPr>
+            <p:cNvPr id="106" name="Rectangle 105">
+              <a:extLst>
+                <a:ext uri="{FF2B5EF4-FFF2-40B4-BE49-F238E27FC236}">
+                  <a16:creationId xmlns:a16="http://schemas.microsoft.com/office/drawing/2014/main" id="{CFE32841-6022-5F8E-818A-43EA47E9FB89}"/>
+                </a:ext>
+              </a:extLst>
+            </p:cNvPr>
+            <p:cNvSpPr/>
+            <p:nvPr/>
+          </p:nvSpPr>
+          <p:spPr>
+            <a:xfrm>
+              <a:off x="1040747" y="1619373"/>
+              <a:ext cx="144000" cy="144000"/>
+            </a:xfrm>
+            <a:prstGeom prst="rect">
+              <a:avLst/>
+            </a:prstGeom>
+            <a:noFill/>
+            <a:ln w="3175">
+              <a:solidFill>
+                <a:schemeClr val="tx1">
+                  <a:lumMod val="75000"/>
+                  <a:lumOff val="25000"/>
+                </a:schemeClr>
+              </a:solidFill>
+            </a:ln>
+          </p:spPr>
+          <p:style>
+            <a:lnRef idx="2">
+              <a:schemeClr val="accent1">
+                <a:shade val="15000"/>
+              </a:schemeClr>
+            </a:lnRef>
+            <a:fillRef idx="1">
+              <a:schemeClr val="accent1"/>
+            </a:fillRef>
+            <a:effectRef idx="0">
+              <a:schemeClr val="accent1"/>
+            </a:effectRef>
+            <a:fontRef idx="minor">
+              <a:schemeClr val="lt1"/>
+            </a:fontRef>
+          </p:style>
+          <p:txBody>
+            <a:bodyPr rtlCol="0" anchor="ctr"/>
+            <a:lstStyle/>
+            <a:p>
+              <a:pPr algn="ctr"/>
+              <a:endParaRPr lang="en-GB"/>
+            </a:p>
+          </p:txBody>
+        </p:sp>
+      </p:grpSp>
     </p:spTree>
     <p:extLst>
       <p:ext uri="{BB962C8B-B14F-4D97-AF65-F5344CB8AC3E}">

</xml_diff>